<commit_message>
update report and literature
</commit_message>
<xml_diff>
--- a/Report/images/ppt_for_editing.pptx
+++ b/Report/images/ppt_for_editing.pptx
@@ -5487,116 +5487,6 @@
       </p:grpSp>
       <p:grpSp>
         <p:nvGrpSpPr>
-          <p:cNvPr id="38" name="Groep 37">
-            <a:extLst>
-              <a:ext uri="{FF2B5EF4-FFF2-40B4-BE49-F238E27FC236}">
-                <a16:creationId xmlns:a16="http://schemas.microsoft.com/office/drawing/2014/main" id="{5E6760C8-D435-B74E-AE53-FC963D555BE2}"/>
-              </a:ext>
-            </a:extLst>
-          </p:cNvPr>
-          <p:cNvGrpSpPr/>
-          <p:nvPr/>
-        </p:nvGrpSpPr>
-        <p:grpSpPr>
-          <a:xfrm>
-            <a:off x="1271958" y="3551903"/>
-            <a:ext cx="1026942" cy="675249"/>
-            <a:chOff x="569739" y="3566363"/>
-            <a:chExt cx="1026942" cy="675249"/>
-          </a:xfrm>
-        </p:grpSpPr>
-        <p:sp>
-          <p:nvSpPr>
-            <p:cNvPr id="39" name="Afgeronde rechthoek 38">
-              <a:extLst>
-                <a:ext uri="{FF2B5EF4-FFF2-40B4-BE49-F238E27FC236}">
-                  <a16:creationId xmlns:a16="http://schemas.microsoft.com/office/drawing/2014/main" id="{AF1FB68A-19EB-A545-84EE-801F6CDBB332}"/>
-                </a:ext>
-              </a:extLst>
-            </p:cNvPr>
-            <p:cNvSpPr/>
-            <p:nvPr/>
-          </p:nvSpPr>
-          <p:spPr>
-            <a:xfrm>
-              <a:off x="569739" y="3566363"/>
-              <a:ext cx="1026942" cy="675249"/>
-            </a:xfrm>
-            <a:prstGeom prst="roundRect">
-              <a:avLst/>
-            </a:prstGeom>
-            <a:solidFill>
-              <a:srgbClr val="E1F7D0"/>
-            </a:solidFill>
-            <a:ln>
-              <a:solidFill>
-                <a:schemeClr val="accent6"/>
-              </a:solidFill>
-            </a:ln>
-          </p:spPr>
-          <p:style>
-            <a:lnRef idx="2">
-              <a:schemeClr val="accent1">
-                <a:shade val="50000"/>
-              </a:schemeClr>
-            </a:lnRef>
-            <a:fillRef idx="1">
-              <a:schemeClr val="accent1"/>
-            </a:fillRef>
-            <a:effectRef idx="0">
-              <a:schemeClr val="accent1"/>
-            </a:effectRef>
-            <a:fontRef idx="minor">
-              <a:schemeClr val="lt1"/>
-            </a:fontRef>
-          </p:style>
-          <p:txBody>
-            <a:bodyPr rtlCol="0" anchor="ctr"/>
-            <a:lstStyle/>
-            <a:p>
-              <a:pPr algn="ctr"/>
-              <a:endParaRPr lang="nl-NL"/>
-            </a:p>
-          </p:txBody>
-        </p:sp>
-        <p:sp>
-          <p:nvSpPr>
-            <p:cNvPr id="40" name="Tekstvak 39">
-              <a:extLst>
-                <a:ext uri="{FF2B5EF4-FFF2-40B4-BE49-F238E27FC236}">
-                  <a16:creationId xmlns:a16="http://schemas.microsoft.com/office/drawing/2014/main" id="{1028C367-BC6B-CC48-A403-88609CD96E60}"/>
-                </a:ext>
-              </a:extLst>
-            </p:cNvPr>
-            <p:cNvSpPr txBox="1"/>
-            <p:nvPr/>
-          </p:nvSpPr>
-          <p:spPr>
-            <a:xfrm>
-              <a:off x="851093" y="3580821"/>
-              <a:ext cx="464234" cy="646331"/>
-            </a:xfrm>
-            <a:prstGeom prst="rect">
-              <a:avLst/>
-            </a:prstGeom>
-            <a:noFill/>
-          </p:spPr>
-          <p:txBody>
-            <a:bodyPr wrap="square" rtlCol="0">
-              <a:spAutoFit/>
-            </a:bodyPr>
-            <a:lstStyle/>
-            <a:p>
-              <a:r>
-                <a:rPr lang="nl-NL" sz="3600" dirty="0"/>
-                <a:t>A</a:t>
-              </a:r>
-            </a:p>
-          </p:txBody>
-        </p:sp>
-      </p:grpSp>
-      <p:grpSp>
-        <p:nvGrpSpPr>
           <p:cNvPr id="41" name="Groep 40">
             <a:extLst>
               <a:ext uri="{FF2B5EF4-FFF2-40B4-BE49-F238E27FC236}">
@@ -6581,15 +6471,16 @@
             </a:extLst>
           </p:cNvPr>
           <p:cNvCxnSpPr>
+            <a:cxnSpLocks/>
             <a:stCxn id="4" idx="0"/>
-            <a:endCxn id="40" idx="2"/>
+            <a:endCxn id="51" idx="1"/>
           </p:cNvCxnSpPr>
           <p:nvPr/>
         </p:nvCxnSpPr>
         <p:spPr>
           <a:xfrm flipV="1">
-            <a:off x="1083212" y="4212692"/>
-            <a:ext cx="702217" cy="626594"/>
+            <a:off x="1083212" y="3069688"/>
+            <a:ext cx="1215687" cy="1769598"/>
           </a:xfrm>
           <a:prstGeom prst="straightConnector1">
             <a:avLst/>
@@ -6623,15 +6514,16 @@
             </a:extLst>
           </p:cNvPr>
           <p:cNvCxnSpPr>
+            <a:cxnSpLocks/>
             <a:stCxn id="21" idx="0"/>
-            <a:endCxn id="40" idx="2"/>
+            <a:endCxn id="47" idx="3"/>
           </p:cNvCxnSpPr>
           <p:nvPr/>
         </p:nvCxnSpPr>
         <p:spPr>
           <a:xfrm flipH="1" flipV="1">
-            <a:off x="1785429" y="4212692"/>
-            <a:ext cx="763757" cy="622282"/>
+            <a:off x="1275460" y="3069689"/>
+            <a:ext cx="1273726" cy="1765285"/>
           </a:xfrm>
           <a:prstGeom prst="straightConnector1">
             <a:avLst/>
@@ -6801,49 +6693,6 @@
           <a:xfrm flipH="1" flipV="1">
             <a:off x="6998996" y="4223032"/>
             <a:ext cx="693096" cy="611945"/>
-          </a:xfrm>
-          <a:prstGeom prst="straightConnector1">
-            <a:avLst/>
-          </a:prstGeom>
-          <a:ln>
-            <a:tailEnd type="triangle"/>
-          </a:ln>
-        </p:spPr>
-        <p:style>
-          <a:lnRef idx="1">
-            <a:schemeClr val="dk1"/>
-          </a:lnRef>
-          <a:fillRef idx="0">
-            <a:schemeClr val="dk1"/>
-          </a:fillRef>
-          <a:effectRef idx="0">
-            <a:schemeClr val="dk1"/>
-          </a:effectRef>
-          <a:fontRef idx="minor">
-            <a:schemeClr val="tx1"/>
-          </a:fontRef>
-        </p:style>
-      </p:cxnSp>
-      <p:cxnSp>
-        <p:nvCxnSpPr>
-          <p:cNvPr id="80" name="Rechte verbindingslijn met pijl 79">
-            <a:extLst>
-              <a:ext uri="{FF2B5EF4-FFF2-40B4-BE49-F238E27FC236}">
-                <a16:creationId xmlns:a16="http://schemas.microsoft.com/office/drawing/2014/main" id="{298F864A-C7BD-CF41-8FA5-A307FB7EBA5B}"/>
-              </a:ext>
-            </a:extLst>
-          </p:cNvPr>
-          <p:cNvCxnSpPr>
-            <a:cxnSpLocks/>
-            <a:stCxn id="40" idx="0"/>
-            <a:endCxn id="51" idx="1"/>
-          </p:cNvCxnSpPr>
-          <p:nvPr/>
-        </p:nvCxnSpPr>
-        <p:spPr>
-          <a:xfrm flipV="1">
-            <a:off x="1785429" y="3069688"/>
-            <a:ext cx="513470" cy="496673"/>
           </a:xfrm>
           <a:prstGeom prst="straightConnector1">
             <a:avLst/>
@@ -7016,49 +6865,6 @@
           <a:xfrm flipV="1">
             <a:off x="7512467" y="3342113"/>
             <a:ext cx="107894" cy="543295"/>
-          </a:xfrm>
-          <a:prstGeom prst="straightConnector1">
-            <a:avLst/>
-          </a:prstGeom>
-          <a:ln>
-            <a:tailEnd type="triangle"/>
-          </a:ln>
-        </p:spPr>
-        <p:style>
-          <a:lnRef idx="1">
-            <a:schemeClr val="dk1"/>
-          </a:lnRef>
-          <a:fillRef idx="0">
-            <a:schemeClr val="dk1"/>
-          </a:fillRef>
-          <a:effectRef idx="0">
-            <a:schemeClr val="dk1"/>
-          </a:effectRef>
-          <a:fontRef idx="minor">
-            <a:schemeClr val="tx1"/>
-          </a:fontRef>
-        </p:style>
-      </p:cxnSp>
-      <p:cxnSp>
-        <p:nvCxnSpPr>
-          <p:cNvPr id="103" name="Rechte verbindingslijn met pijl 102">
-            <a:extLst>
-              <a:ext uri="{FF2B5EF4-FFF2-40B4-BE49-F238E27FC236}">
-                <a16:creationId xmlns:a16="http://schemas.microsoft.com/office/drawing/2014/main" id="{34DF540B-AD85-D94F-BB95-F8F932173378}"/>
-              </a:ext>
-            </a:extLst>
-          </p:cNvPr>
-          <p:cNvCxnSpPr>
-            <a:cxnSpLocks/>
-            <a:stCxn id="39" idx="0"/>
-            <a:endCxn id="47" idx="3"/>
-          </p:cNvCxnSpPr>
-          <p:nvPr/>
-        </p:nvCxnSpPr>
-        <p:spPr>
-          <a:xfrm flipH="1" flipV="1">
-            <a:off x="1275460" y="3069689"/>
-            <a:ext cx="509969" cy="482214"/>
           </a:xfrm>
           <a:prstGeom prst="straightConnector1">
             <a:avLst/>
@@ -7875,6 +7681,333 @@
           </a:fontRef>
         </p:style>
       </p:cxnSp>
+      <p:sp>
+        <p:nvSpPr>
+          <p:cNvPr id="140" name="Tekstvak 139">
+            <a:extLst>
+              <a:ext uri="{FF2B5EF4-FFF2-40B4-BE49-F238E27FC236}">
+                <a16:creationId xmlns:a16="http://schemas.microsoft.com/office/drawing/2014/main" id="{B540F802-936D-2447-A3CF-6B976C036CFF}"/>
+              </a:ext>
+            </a:extLst>
+          </p:cNvPr>
+          <p:cNvSpPr txBox="1"/>
+          <p:nvPr/>
+        </p:nvSpPr>
+        <p:spPr>
+          <a:xfrm>
+            <a:off x="690079" y="5562510"/>
+            <a:ext cx="2054601" cy="369332"/>
+          </a:xfrm>
+          <a:prstGeom prst="rect">
+            <a:avLst/>
+          </a:prstGeom>
+          <a:noFill/>
+        </p:spPr>
+        <p:txBody>
+          <a:bodyPr wrap="none" rtlCol="0">
+            <a:spAutoFit/>
+          </a:bodyPr>
+          <a:lstStyle/>
+          <a:p>
+            <a:r>
+              <a:rPr lang="nl-NL" dirty="0"/>
+              <a:t>t-1</a:t>
+            </a:r>
+            <a:r>
+              <a:rPr lang="nl-NL" baseline="30000" dirty="0"/>
+              <a:t>st</a:t>
+            </a:r>
+            <a:r>
+              <a:rPr lang="nl-NL" dirty="0"/>
+              <a:t> training sample</a:t>
+            </a:r>
+          </a:p>
+        </p:txBody>
+      </p:sp>
+      <p:sp>
+        <p:nvSpPr>
+          <p:cNvPr id="142" name="Tekstvak 141">
+            <a:extLst>
+              <a:ext uri="{FF2B5EF4-FFF2-40B4-BE49-F238E27FC236}">
+                <a16:creationId xmlns:a16="http://schemas.microsoft.com/office/drawing/2014/main" id="{45FE5ECC-9246-EE4C-801D-96F419F04B1F}"/>
+              </a:ext>
+            </a:extLst>
+          </p:cNvPr>
+          <p:cNvSpPr txBox="1"/>
+          <p:nvPr/>
+        </p:nvSpPr>
+        <p:spPr>
+          <a:xfrm>
+            <a:off x="3320130" y="5598861"/>
+            <a:ext cx="1937582" cy="369332"/>
+          </a:xfrm>
+          <a:prstGeom prst="rect">
+            <a:avLst/>
+          </a:prstGeom>
+          <a:noFill/>
+        </p:spPr>
+        <p:txBody>
+          <a:bodyPr wrap="none" rtlCol="0">
+            <a:spAutoFit/>
+          </a:bodyPr>
+          <a:lstStyle/>
+          <a:p>
+            <a:r>
+              <a:rPr lang="nl-NL" dirty="0" err="1"/>
+              <a:t>t</a:t>
+            </a:r>
+            <a:r>
+              <a:rPr lang="nl-NL" baseline="30000" dirty="0" err="1"/>
+              <a:t>st</a:t>
+            </a:r>
+            <a:r>
+              <a:rPr lang="nl-NL" dirty="0"/>
+              <a:t> training sample</a:t>
+            </a:r>
+          </a:p>
+        </p:txBody>
+      </p:sp>
+      <p:sp>
+        <p:nvSpPr>
+          <p:cNvPr id="143" name="Tekstvak 142">
+            <a:extLst>
+              <a:ext uri="{FF2B5EF4-FFF2-40B4-BE49-F238E27FC236}">
+                <a16:creationId xmlns:a16="http://schemas.microsoft.com/office/drawing/2014/main" id="{55A9C329-B827-B741-B471-7005E5AF253F}"/>
+              </a:ext>
+            </a:extLst>
+          </p:cNvPr>
+          <p:cNvSpPr txBox="1"/>
+          <p:nvPr/>
+        </p:nvSpPr>
+        <p:spPr>
+          <a:xfrm>
+            <a:off x="5924607" y="5620228"/>
+            <a:ext cx="1917897" cy="369332"/>
+          </a:xfrm>
+          <a:prstGeom prst="rect">
+            <a:avLst/>
+          </a:prstGeom>
+          <a:noFill/>
+        </p:spPr>
+        <p:txBody>
+          <a:bodyPr wrap="none" rtlCol="0">
+            <a:spAutoFit/>
+          </a:bodyPr>
+          <a:lstStyle/>
+          <a:p>
+            <a:r>
+              <a:rPr lang="nl-NL" dirty="0" err="1"/>
+              <a:t>p</a:t>
+            </a:r>
+            <a:r>
+              <a:rPr lang="nl-NL" baseline="30000" dirty="0" err="1"/>
+              <a:t>st</a:t>
+            </a:r>
+            <a:r>
+              <a:rPr lang="nl-NL" dirty="0"/>
+              <a:t> training sample</a:t>
+            </a:r>
+          </a:p>
+        </p:txBody>
+      </p:sp>
+      <p:cxnSp>
+        <p:nvCxnSpPr>
+          <p:cNvPr id="145" name="Rechte verbindingslijn met pijl 144">
+            <a:extLst>
+              <a:ext uri="{FF2B5EF4-FFF2-40B4-BE49-F238E27FC236}">
+                <a16:creationId xmlns:a16="http://schemas.microsoft.com/office/drawing/2014/main" id="{7671C3CC-8021-3C40-AC05-4E99674A9B2C}"/>
+              </a:ext>
+            </a:extLst>
+          </p:cNvPr>
+          <p:cNvCxnSpPr>
+            <a:cxnSpLocks/>
+            <a:stCxn id="4" idx="0"/>
+            <a:endCxn id="12" idx="4"/>
+          </p:cNvCxnSpPr>
+          <p:nvPr/>
+        </p:nvCxnSpPr>
+        <p:spPr>
+          <a:xfrm flipH="1" flipV="1">
+            <a:off x="1055688" y="3254382"/>
+            <a:ext cx="27524" cy="1584904"/>
+          </a:xfrm>
+          <a:prstGeom prst="straightConnector1">
+            <a:avLst/>
+          </a:prstGeom>
+          <a:ln>
+            <a:tailEnd type="triangle"/>
+          </a:ln>
+        </p:spPr>
+        <p:style>
+          <a:lnRef idx="1">
+            <a:schemeClr val="dk1"/>
+          </a:lnRef>
+          <a:fillRef idx="0">
+            <a:schemeClr val="dk1"/>
+          </a:fillRef>
+          <a:effectRef idx="0">
+            <a:schemeClr val="dk1"/>
+          </a:effectRef>
+          <a:fontRef idx="minor">
+            <a:schemeClr val="tx1"/>
+          </a:fontRef>
+        </p:style>
+      </p:cxnSp>
+      <p:cxnSp>
+        <p:nvCxnSpPr>
+          <p:cNvPr id="149" name="Rechte verbindingslijn met pijl 148">
+            <a:extLst>
+              <a:ext uri="{FF2B5EF4-FFF2-40B4-BE49-F238E27FC236}">
+                <a16:creationId xmlns:a16="http://schemas.microsoft.com/office/drawing/2014/main" id="{466AFA55-F872-BF4C-9867-F9BC5D957C0C}"/>
+              </a:ext>
+            </a:extLst>
+          </p:cNvPr>
+          <p:cNvCxnSpPr>
+            <a:cxnSpLocks/>
+            <a:stCxn id="21" idx="0"/>
+            <a:endCxn id="51" idx="2"/>
+          </p:cNvCxnSpPr>
+          <p:nvPr/>
+        </p:nvCxnSpPr>
+        <p:spPr>
+          <a:xfrm flipV="1">
+            <a:off x="2549186" y="3200493"/>
+            <a:ext cx="3192" cy="1634481"/>
+          </a:xfrm>
+          <a:prstGeom prst="straightConnector1">
+            <a:avLst/>
+          </a:prstGeom>
+          <a:ln>
+            <a:tailEnd type="triangle"/>
+          </a:ln>
+        </p:spPr>
+        <p:style>
+          <a:lnRef idx="1">
+            <a:schemeClr val="dk1"/>
+          </a:lnRef>
+          <a:fillRef idx="0">
+            <a:schemeClr val="dk1"/>
+          </a:fillRef>
+          <a:effectRef idx="0">
+            <a:schemeClr val="dk1"/>
+          </a:effectRef>
+          <a:fontRef idx="minor">
+            <a:schemeClr val="tx1"/>
+          </a:fontRef>
+        </p:style>
+      </p:cxnSp>
+      <p:grpSp>
+        <p:nvGrpSpPr>
+          <p:cNvPr id="38" name="Groep 37">
+            <a:extLst>
+              <a:ext uri="{FF2B5EF4-FFF2-40B4-BE49-F238E27FC236}">
+                <a16:creationId xmlns:a16="http://schemas.microsoft.com/office/drawing/2014/main" id="{5E6760C8-D435-B74E-AE53-FC963D555BE2}"/>
+              </a:ext>
+            </a:extLst>
+          </p:cNvPr>
+          <p:cNvGrpSpPr/>
+          <p:nvPr/>
+        </p:nvGrpSpPr>
+        <p:grpSpPr>
+          <a:xfrm>
+            <a:off x="891497" y="3494384"/>
+            <a:ext cx="1853183" cy="1051009"/>
+            <a:chOff x="569739" y="3566363"/>
+            <a:chExt cx="1026942" cy="675249"/>
+          </a:xfrm>
+        </p:grpSpPr>
+        <p:sp>
+          <p:nvSpPr>
+            <p:cNvPr id="39" name="Afgeronde rechthoek 38">
+              <a:extLst>
+                <a:ext uri="{FF2B5EF4-FFF2-40B4-BE49-F238E27FC236}">
+                  <a16:creationId xmlns:a16="http://schemas.microsoft.com/office/drawing/2014/main" id="{AF1FB68A-19EB-A545-84EE-801F6CDBB332}"/>
+                </a:ext>
+              </a:extLst>
+            </p:cNvPr>
+            <p:cNvSpPr/>
+            <p:nvPr/>
+          </p:nvSpPr>
+          <p:spPr>
+            <a:xfrm>
+              <a:off x="569739" y="3566363"/>
+              <a:ext cx="1026942" cy="675249"/>
+            </a:xfrm>
+            <a:prstGeom prst="roundRect">
+              <a:avLst/>
+            </a:prstGeom>
+            <a:solidFill>
+              <a:srgbClr val="E1F7D0">
+                <a:alpha val="85000"/>
+              </a:srgbClr>
+            </a:solidFill>
+            <a:ln>
+              <a:solidFill>
+                <a:schemeClr val="accent6"/>
+              </a:solidFill>
+            </a:ln>
+          </p:spPr>
+          <p:style>
+            <a:lnRef idx="2">
+              <a:schemeClr val="accent1">
+                <a:shade val="50000"/>
+              </a:schemeClr>
+            </a:lnRef>
+            <a:fillRef idx="1">
+              <a:schemeClr val="accent1"/>
+            </a:fillRef>
+            <a:effectRef idx="0">
+              <a:schemeClr val="accent1"/>
+            </a:effectRef>
+            <a:fontRef idx="minor">
+              <a:schemeClr val="lt1"/>
+            </a:fontRef>
+          </p:style>
+          <p:txBody>
+            <a:bodyPr rtlCol="0" anchor="ctr"/>
+            <a:lstStyle/>
+            <a:p>
+              <a:pPr algn="ctr"/>
+              <a:endParaRPr lang="nl-NL"/>
+            </a:p>
+          </p:txBody>
+        </p:sp>
+        <p:sp>
+          <p:nvSpPr>
+            <p:cNvPr id="40" name="Tekstvak 39">
+              <a:extLst>
+                <a:ext uri="{FF2B5EF4-FFF2-40B4-BE49-F238E27FC236}">
+                  <a16:creationId xmlns:a16="http://schemas.microsoft.com/office/drawing/2014/main" id="{1028C367-BC6B-CC48-A403-88609CD96E60}"/>
+                </a:ext>
+              </a:extLst>
+            </p:cNvPr>
+            <p:cNvSpPr txBox="1"/>
+            <p:nvPr/>
+          </p:nvSpPr>
+          <p:spPr>
+            <a:xfrm>
+              <a:off x="961940" y="3660828"/>
+              <a:ext cx="241542" cy="415253"/>
+            </a:xfrm>
+            <a:prstGeom prst="rect">
+              <a:avLst/>
+            </a:prstGeom>
+            <a:noFill/>
+          </p:spPr>
+          <p:txBody>
+            <a:bodyPr wrap="square" rtlCol="0">
+              <a:spAutoFit/>
+            </a:bodyPr>
+            <a:lstStyle/>
+            <a:p>
+              <a:r>
+                <a:rPr lang="nl-NL" sz="3600" dirty="0"/>
+                <a:t>A</a:t>
+              </a:r>
+            </a:p>
+          </p:txBody>
+        </p:sp>
+      </p:grpSp>
     </p:spTree>
     <p:extLst>
       <p:ext uri="{BB962C8B-B14F-4D97-AF65-F5344CB8AC3E}">

</xml_diff>

<commit_message>
implemented time dependent BC,working AE implementation
</commit_message>
<xml_diff>
--- a/Report/images/ppt_for_editing.pptx
+++ b/Report/images/ppt_for_editing.pptx
@@ -263,7 +263,7 @@
           <a:p>
             <a:fld id="{15F5C6DF-5D78-8146-8AF0-DC13752353FA}" type="datetimeFigureOut">
               <a:rPr lang="nl-NL" smtClean="0"/>
-              <a:t>14-02-2022</a:t>
+              <a:t>17-02-2022</a:t>
             </a:fld>
             <a:endParaRPr lang="nl-NL"/>
           </a:p>
@@ -461,7 +461,7 @@
           <a:p>
             <a:fld id="{15F5C6DF-5D78-8146-8AF0-DC13752353FA}" type="datetimeFigureOut">
               <a:rPr lang="nl-NL" smtClean="0"/>
-              <a:t>14-02-2022</a:t>
+              <a:t>17-02-2022</a:t>
             </a:fld>
             <a:endParaRPr lang="nl-NL"/>
           </a:p>
@@ -669,7 +669,7 @@
           <a:p>
             <a:fld id="{15F5C6DF-5D78-8146-8AF0-DC13752353FA}" type="datetimeFigureOut">
               <a:rPr lang="nl-NL" smtClean="0"/>
-              <a:t>14-02-2022</a:t>
+              <a:t>17-02-2022</a:t>
             </a:fld>
             <a:endParaRPr lang="nl-NL"/>
           </a:p>
@@ -867,7 +867,7 @@
           <a:p>
             <a:fld id="{15F5C6DF-5D78-8146-8AF0-DC13752353FA}" type="datetimeFigureOut">
               <a:rPr lang="nl-NL" smtClean="0"/>
-              <a:t>14-02-2022</a:t>
+              <a:t>17-02-2022</a:t>
             </a:fld>
             <a:endParaRPr lang="nl-NL"/>
           </a:p>
@@ -1142,7 +1142,7 @@
           <a:p>
             <a:fld id="{15F5C6DF-5D78-8146-8AF0-DC13752353FA}" type="datetimeFigureOut">
               <a:rPr lang="nl-NL" smtClean="0"/>
-              <a:t>14-02-2022</a:t>
+              <a:t>17-02-2022</a:t>
             </a:fld>
             <a:endParaRPr lang="nl-NL"/>
           </a:p>
@@ -1407,7 +1407,7 @@
           <a:p>
             <a:fld id="{15F5C6DF-5D78-8146-8AF0-DC13752353FA}" type="datetimeFigureOut">
               <a:rPr lang="nl-NL" smtClean="0"/>
-              <a:t>14-02-2022</a:t>
+              <a:t>17-02-2022</a:t>
             </a:fld>
             <a:endParaRPr lang="nl-NL"/>
           </a:p>
@@ -1819,7 +1819,7 @@
           <a:p>
             <a:fld id="{15F5C6DF-5D78-8146-8AF0-DC13752353FA}" type="datetimeFigureOut">
               <a:rPr lang="nl-NL" smtClean="0"/>
-              <a:t>14-02-2022</a:t>
+              <a:t>17-02-2022</a:t>
             </a:fld>
             <a:endParaRPr lang="nl-NL"/>
           </a:p>
@@ -1960,7 +1960,7 @@
           <a:p>
             <a:fld id="{15F5C6DF-5D78-8146-8AF0-DC13752353FA}" type="datetimeFigureOut">
               <a:rPr lang="nl-NL" smtClean="0"/>
-              <a:t>14-02-2022</a:t>
+              <a:t>17-02-2022</a:t>
             </a:fld>
             <a:endParaRPr lang="nl-NL"/>
           </a:p>
@@ -2073,7 +2073,7 @@
           <a:p>
             <a:fld id="{15F5C6DF-5D78-8146-8AF0-DC13752353FA}" type="datetimeFigureOut">
               <a:rPr lang="nl-NL" smtClean="0"/>
-              <a:t>14-02-2022</a:t>
+              <a:t>17-02-2022</a:t>
             </a:fld>
             <a:endParaRPr lang="nl-NL"/>
           </a:p>
@@ -2384,7 +2384,7 @@
           <a:p>
             <a:fld id="{15F5C6DF-5D78-8146-8AF0-DC13752353FA}" type="datetimeFigureOut">
               <a:rPr lang="nl-NL" smtClean="0"/>
-              <a:t>14-02-2022</a:t>
+              <a:t>17-02-2022</a:t>
             </a:fld>
             <a:endParaRPr lang="nl-NL"/>
           </a:p>
@@ -2672,7 +2672,7 @@
           <a:p>
             <a:fld id="{15F5C6DF-5D78-8146-8AF0-DC13752353FA}" type="datetimeFigureOut">
               <a:rPr lang="nl-NL" smtClean="0"/>
-              <a:t>14-02-2022</a:t>
+              <a:t>17-02-2022</a:t>
             </a:fld>
             <a:endParaRPr lang="nl-NL"/>
           </a:p>
@@ -2913,7 +2913,7 @@
           <a:p>
             <a:fld id="{15F5C6DF-5D78-8146-8AF0-DC13752353FA}" type="datetimeFigureOut">
               <a:rPr lang="nl-NL" smtClean="0"/>
-              <a:t>14-02-2022</a:t>
+              <a:t>17-02-2022</a:t>
             </a:fld>
             <a:endParaRPr lang="nl-NL"/>
           </a:p>

</xml_diff>

<commit_message>
clean up repo, add README data generation
</commit_message>
<xml_diff>
--- a/Report/images/ppt_for_editing.pptx
+++ b/Report/images/ppt_for_editing.pptx
@@ -11,6 +11,7 @@
     <p:sldId id="259" r:id="rId5"/>
     <p:sldId id="260" r:id="rId6"/>
     <p:sldId id="261" r:id="rId7"/>
+    <p:sldId id="262" r:id="rId8"/>
   </p:sldIdLst>
   <p:sldSz cx="12192000" cy="6858000"/>
   <p:notesSz cx="6858000" cy="9144000"/>
@@ -264,7 +265,7 @@
           <a:p>
             <a:fld id="{15F5C6DF-5D78-8146-8AF0-DC13752353FA}" type="datetimeFigureOut">
               <a:rPr lang="nl-NL" smtClean="0"/>
-              <a:t>25-02-2022</a:t>
+              <a:t>10-03-2022</a:t>
             </a:fld>
             <a:endParaRPr lang="nl-NL"/>
           </a:p>
@@ -462,7 +463,7 @@
           <a:p>
             <a:fld id="{15F5C6DF-5D78-8146-8AF0-DC13752353FA}" type="datetimeFigureOut">
               <a:rPr lang="nl-NL" smtClean="0"/>
-              <a:t>25-02-2022</a:t>
+              <a:t>10-03-2022</a:t>
             </a:fld>
             <a:endParaRPr lang="nl-NL"/>
           </a:p>
@@ -670,7 +671,7 @@
           <a:p>
             <a:fld id="{15F5C6DF-5D78-8146-8AF0-DC13752353FA}" type="datetimeFigureOut">
               <a:rPr lang="nl-NL" smtClean="0"/>
-              <a:t>25-02-2022</a:t>
+              <a:t>10-03-2022</a:t>
             </a:fld>
             <a:endParaRPr lang="nl-NL"/>
           </a:p>
@@ -868,7 +869,7 @@
           <a:p>
             <a:fld id="{15F5C6DF-5D78-8146-8AF0-DC13752353FA}" type="datetimeFigureOut">
               <a:rPr lang="nl-NL" smtClean="0"/>
-              <a:t>25-02-2022</a:t>
+              <a:t>10-03-2022</a:t>
             </a:fld>
             <a:endParaRPr lang="nl-NL"/>
           </a:p>
@@ -1143,7 +1144,7 @@
           <a:p>
             <a:fld id="{15F5C6DF-5D78-8146-8AF0-DC13752353FA}" type="datetimeFigureOut">
               <a:rPr lang="nl-NL" smtClean="0"/>
-              <a:t>25-02-2022</a:t>
+              <a:t>10-03-2022</a:t>
             </a:fld>
             <a:endParaRPr lang="nl-NL"/>
           </a:p>
@@ -1408,7 +1409,7 @@
           <a:p>
             <a:fld id="{15F5C6DF-5D78-8146-8AF0-DC13752353FA}" type="datetimeFigureOut">
               <a:rPr lang="nl-NL" smtClean="0"/>
-              <a:t>25-02-2022</a:t>
+              <a:t>10-03-2022</a:t>
             </a:fld>
             <a:endParaRPr lang="nl-NL"/>
           </a:p>
@@ -1820,7 +1821,7 @@
           <a:p>
             <a:fld id="{15F5C6DF-5D78-8146-8AF0-DC13752353FA}" type="datetimeFigureOut">
               <a:rPr lang="nl-NL" smtClean="0"/>
-              <a:t>25-02-2022</a:t>
+              <a:t>10-03-2022</a:t>
             </a:fld>
             <a:endParaRPr lang="nl-NL"/>
           </a:p>
@@ -1961,7 +1962,7 @@
           <a:p>
             <a:fld id="{15F5C6DF-5D78-8146-8AF0-DC13752353FA}" type="datetimeFigureOut">
               <a:rPr lang="nl-NL" smtClean="0"/>
-              <a:t>25-02-2022</a:t>
+              <a:t>10-03-2022</a:t>
             </a:fld>
             <a:endParaRPr lang="nl-NL"/>
           </a:p>
@@ -2074,7 +2075,7 @@
           <a:p>
             <a:fld id="{15F5C6DF-5D78-8146-8AF0-DC13752353FA}" type="datetimeFigureOut">
               <a:rPr lang="nl-NL" smtClean="0"/>
-              <a:t>25-02-2022</a:t>
+              <a:t>10-03-2022</a:t>
             </a:fld>
             <a:endParaRPr lang="nl-NL"/>
           </a:p>
@@ -2385,7 +2386,7 @@
           <a:p>
             <a:fld id="{15F5C6DF-5D78-8146-8AF0-DC13752353FA}" type="datetimeFigureOut">
               <a:rPr lang="nl-NL" smtClean="0"/>
-              <a:t>25-02-2022</a:t>
+              <a:t>10-03-2022</a:t>
             </a:fld>
             <a:endParaRPr lang="nl-NL"/>
           </a:p>
@@ -2673,7 +2674,7 @@
           <a:p>
             <a:fld id="{15F5C6DF-5D78-8146-8AF0-DC13752353FA}" type="datetimeFigureOut">
               <a:rPr lang="nl-NL" smtClean="0"/>
-              <a:t>25-02-2022</a:t>
+              <a:t>10-03-2022</a:t>
             </a:fld>
             <a:endParaRPr lang="nl-NL"/>
           </a:p>
@@ -2914,7 +2915,7 @@
           <a:p>
             <a:fld id="{15F5C6DF-5D78-8146-8AF0-DC13752353FA}" type="datetimeFigureOut">
               <a:rPr lang="nl-NL" smtClean="0"/>
-              <a:t>25-02-2022</a:t>
+              <a:t>10-03-2022</a:t>
             </a:fld>
             <a:endParaRPr lang="nl-NL"/>
           </a:p>
@@ -3366,13 +3367,8 @@
             </a:r>
             <a:r>
               <a:rPr lang="nl-NL" dirty="0"/>
-              <a:t> </a:t>
+              <a:t> thesis</a:t>
             </a:r>
-            <a:r>
-              <a:rPr lang="nl-NL" dirty="0" err="1"/>
-              <a:t>theis</a:t>
-            </a:r>
-            <a:endParaRPr lang="nl-NL" dirty="0"/>
           </a:p>
         </p:txBody>
       </p:sp>
@@ -12687,6 +12683,1128 @@
 </p:sld>
 </file>
 
+<file path=ppt/slides/slide7.xml><?xml version="1.0" encoding="utf-8"?>
+<p:sld xmlns:a="http://schemas.openxmlformats.org/drawingml/2006/main" xmlns:r="http://schemas.openxmlformats.org/officeDocument/2006/relationships" xmlns:p="http://schemas.openxmlformats.org/presentationml/2006/main">
+  <p:cSld>
+    <p:spTree>
+      <p:nvGrpSpPr>
+        <p:cNvPr id="1" name=""/>
+        <p:cNvGrpSpPr/>
+        <p:nvPr/>
+      </p:nvGrpSpPr>
+      <p:grpSpPr>
+        <a:xfrm>
+          <a:off x="0" y="0"/>
+          <a:ext cx="0" cy="0"/>
+          <a:chOff x="0" y="0"/>
+          <a:chExt cx="0" cy="0"/>
+        </a:xfrm>
+      </p:grpSpPr>
+      <p:sp>
+        <p:nvSpPr>
+          <p:cNvPr id="99" name="Tekstvak 98">
+            <a:extLst>
+              <a:ext uri="{FF2B5EF4-FFF2-40B4-BE49-F238E27FC236}">
+                <a16:creationId xmlns:a16="http://schemas.microsoft.com/office/drawing/2014/main" id="{A30E651D-7F61-614F-B391-AE78226538E1}"/>
+              </a:ext>
+            </a:extLst>
+          </p:cNvPr>
+          <p:cNvSpPr txBox="1"/>
+          <p:nvPr/>
+        </p:nvSpPr>
+        <p:spPr>
+          <a:xfrm>
+            <a:off x="11101388" y="4572000"/>
+            <a:ext cx="184731" cy="369332"/>
+          </a:xfrm>
+          <a:prstGeom prst="rect">
+            <a:avLst/>
+          </a:prstGeom>
+          <a:noFill/>
+        </p:spPr>
+        <p:txBody>
+          <a:bodyPr wrap="none" rtlCol="0">
+            <a:spAutoFit/>
+          </a:bodyPr>
+          <a:lstStyle/>
+          <a:p>
+            <a:endParaRPr lang="nl-NL" dirty="0"/>
+          </a:p>
+        </p:txBody>
+      </p:sp>
+      <p:grpSp>
+        <p:nvGrpSpPr>
+          <p:cNvPr id="101" name="Groep 100">
+            <a:extLst>
+              <a:ext uri="{FF2B5EF4-FFF2-40B4-BE49-F238E27FC236}">
+                <a16:creationId xmlns:a16="http://schemas.microsoft.com/office/drawing/2014/main" id="{22E6D4F9-D5DA-704E-893C-97779C9ED3D6}"/>
+              </a:ext>
+            </a:extLst>
+          </p:cNvPr>
+          <p:cNvGrpSpPr/>
+          <p:nvPr/>
+        </p:nvGrpSpPr>
+        <p:grpSpPr>
+          <a:xfrm>
+            <a:off x="696532" y="2822574"/>
+            <a:ext cx="11079577" cy="2556417"/>
+            <a:chOff x="810832" y="2822574"/>
+            <a:chExt cx="11079577" cy="2556417"/>
+          </a:xfrm>
+        </p:grpSpPr>
+        <p:pic>
+          <p:nvPicPr>
+            <p:cNvPr id="5" name="Afbeelding 4">
+              <a:extLst>
+                <a:ext uri="{FF2B5EF4-FFF2-40B4-BE49-F238E27FC236}">
+                  <a16:creationId xmlns:a16="http://schemas.microsoft.com/office/drawing/2014/main" id="{62E315B1-0E69-324A-91A9-5E56AB74C6BE}"/>
+                </a:ext>
+              </a:extLst>
+            </p:cNvPr>
+            <p:cNvPicPr>
+              <a:picLocks noChangeAspect="1"/>
+            </p:cNvPicPr>
+            <p:nvPr/>
+          </p:nvPicPr>
+          <p:blipFill>
+            <a:blip r:embed="rId2"/>
+            <a:stretch>
+              <a:fillRect/>
+            </a:stretch>
+          </p:blipFill>
+          <p:spPr>
+            <a:xfrm>
+              <a:off x="7743735" y="3370885"/>
+              <a:ext cx="1025273" cy="1025273"/>
+            </a:xfrm>
+            <a:prstGeom prst="rect">
+              <a:avLst/>
+            </a:prstGeom>
+          </p:spPr>
+        </p:pic>
+        <p:pic>
+          <p:nvPicPr>
+            <p:cNvPr id="9" name="Afbeelding 8">
+              <a:extLst>
+                <a:ext uri="{FF2B5EF4-FFF2-40B4-BE49-F238E27FC236}">
+                  <a16:creationId xmlns:a16="http://schemas.microsoft.com/office/drawing/2014/main" id="{FB743ED5-F8FD-3A4E-8377-F9A5277759B0}"/>
+                </a:ext>
+              </a:extLst>
+            </p:cNvPr>
+            <p:cNvPicPr>
+              <a:picLocks noChangeAspect="1"/>
+            </p:cNvPicPr>
+            <p:nvPr/>
+          </p:nvPicPr>
+          <p:blipFill>
+            <a:blip r:embed="rId3"/>
+            <a:stretch>
+              <a:fillRect/>
+            </a:stretch>
+          </p:blipFill>
+          <p:spPr>
+            <a:xfrm>
+              <a:off x="4551629" y="3325690"/>
+              <a:ext cx="1115662" cy="1115662"/>
+            </a:xfrm>
+            <a:prstGeom prst="rect">
+              <a:avLst/>
+            </a:prstGeom>
+          </p:spPr>
+        </p:pic>
+        <p:pic>
+          <p:nvPicPr>
+            <p:cNvPr id="11" name="Afbeelding 10">
+              <a:extLst>
+                <a:ext uri="{FF2B5EF4-FFF2-40B4-BE49-F238E27FC236}">
+                  <a16:creationId xmlns:a16="http://schemas.microsoft.com/office/drawing/2014/main" id="{8A332962-3CE4-D745-A2C2-0D2E9FD6FE09}"/>
+                </a:ext>
+              </a:extLst>
+            </p:cNvPr>
+            <p:cNvPicPr>
+              <a:picLocks noChangeAspect="1"/>
+            </p:cNvPicPr>
+            <p:nvPr/>
+          </p:nvPicPr>
+          <p:blipFill>
+            <a:blip r:embed="rId4"/>
+            <a:stretch>
+              <a:fillRect/>
+            </a:stretch>
+          </p:blipFill>
+          <p:spPr>
+            <a:xfrm>
+              <a:off x="6147682" y="3317084"/>
+              <a:ext cx="1115662" cy="1115662"/>
+            </a:xfrm>
+            <a:prstGeom prst="rect">
+              <a:avLst/>
+            </a:prstGeom>
+          </p:spPr>
+        </p:pic>
+        <p:pic>
+          <p:nvPicPr>
+            <p:cNvPr id="13" name="Afbeelding 12">
+              <a:extLst>
+                <a:ext uri="{FF2B5EF4-FFF2-40B4-BE49-F238E27FC236}">
+                  <a16:creationId xmlns:a16="http://schemas.microsoft.com/office/drawing/2014/main" id="{BC3441CF-2B35-BF40-9CFB-74BAE924EB8E}"/>
+                </a:ext>
+              </a:extLst>
+            </p:cNvPr>
+            <p:cNvPicPr>
+              <a:picLocks noChangeAspect="1"/>
+            </p:cNvPicPr>
+            <p:nvPr/>
+          </p:nvPicPr>
+          <p:blipFill>
+            <a:blip r:embed="rId5"/>
+            <a:stretch>
+              <a:fillRect/>
+            </a:stretch>
+          </p:blipFill>
+          <p:spPr>
+            <a:xfrm>
+              <a:off x="2942601" y="2825767"/>
+              <a:ext cx="882500" cy="882500"/>
+            </a:xfrm>
+            <a:prstGeom prst="rect">
+              <a:avLst/>
+            </a:prstGeom>
+          </p:spPr>
+        </p:pic>
+        <p:pic>
+          <p:nvPicPr>
+            <p:cNvPr id="15" name="Afbeelding 14">
+              <a:extLst>
+                <a:ext uri="{FF2B5EF4-FFF2-40B4-BE49-F238E27FC236}">
+                  <a16:creationId xmlns:a16="http://schemas.microsoft.com/office/drawing/2014/main" id="{EA2DC9FE-6DE7-994C-A2FD-F0E9B7C2FB6C}"/>
+                </a:ext>
+              </a:extLst>
+            </p:cNvPr>
+            <p:cNvPicPr>
+              <a:picLocks noChangeAspect="1"/>
+            </p:cNvPicPr>
+            <p:nvPr/>
+          </p:nvPicPr>
+          <p:blipFill>
+            <a:blip r:embed="rId6"/>
+            <a:stretch>
+              <a:fillRect/>
+            </a:stretch>
+          </p:blipFill>
+          <p:spPr>
+            <a:xfrm>
+              <a:off x="10908413" y="3483707"/>
+              <a:ext cx="787516" cy="787516"/>
+            </a:xfrm>
+            <a:prstGeom prst="rect">
+              <a:avLst/>
+            </a:prstGeom>
+          </p:spPr>
+        </p:pic>
+        <p:pic>
+          <p:nvPicPr>
+            <p:cNvPr id="17" name="Afbeelding 16">
+              <a:extLst>
+                <a:ext uri="{FF2B5EF4-FFF2-40B4-BE49-F238E27FC236}">
+                  <a16:creationId xmlns:a16="http://schemas.microsoft.com/office/drawing/2014/main" id="{619BAF22-720A-6C4F-A3B1-0DCD11EF8C03}"/>
+                </a:ext>
+              </a:extLst>
+            </p:cNvPr>
+            <p:cNvPicPr>
+              <a:picLocks noChangeAspect="1"/>
+            </p:cNvPicPr>
+            <p:nvPr/>
+          </p:nvPicPr>
+          <p:blipFill>
+            <a:blip r:embed="rId7">
+              <a:duotone>
+                <a:prstClr val="black"/>
+                <a:schemeClr val="tx2">
+                  <a:tint val="45000"/>
+                  <a:satMod val="400000"/>
+                </a:schemeClr>
+              </a:duotone>
+              <a:extLst>
+                <a:ext uri="{BEBA8EAE-BF5A-486C-A8C5-ECC9F3942E4B}">
+                  <a14:imgProps xmlns:a14="http://schemas.microsoft.com/office/drawing/2010/main">
+                    <a14:imgLayer r:embed="rId8">
+                      <a14:imgEffect>
+                        <a14:colorTemperature colorTemp="4700"/>
+                      </a14:imgEffect>
+                    </a14:imgLayer>
+                  </a14:imgProps>
+                </a:ext>
+              </a:extLst>
+            </a:blip>
+            <a:stretch>
+              <a:fillRect/>
+            </a:stretch>
+          </p:blipFill>
+          <p:spPr>
+            <a:xfrm>
+              <a:off x="9249399" y="3550528"/>
+              <a:ext cx="1242901" cy="665988"/>
+            </a:xfrm>
+            <a:prstGeom prst="rect">
+              <a:avLst/>
+            </a:prstGeom>
+          </p:spPr>
+        </p:pic>
+        <p:cxnSp>
+          <p:nvCxnSpPr>
+            <p:cNvPr id="19" name="Rechte verbindingslijn met pijl 18">
+              <a:extLst>
+                <a:ext uri="{FF2B5EF4-FFF2-40B4-BE49-F238E27FC236}">
+                  <a16:creationId xmlns:a16="http://schemas.microsoft.com/office/drawing/2014/main" id="{E3DAF9AC-B6C9-424F-8FB8-5BA4191A16EC}"/>
+                </a:ext>
+              </a:extLst>
+            </p:cNvPr>
+            <p:cNvCxnSpPr>
+              <a:cxnSpLocks/>
+              <a:stCxn id="70" idx="3"/>
+              <a:endCxn id="13" idx="1"/>
+            </p:cNvCxnSpPr>
+            <p:nvPr/>
+          </p:nvCxnSpPr>
+          <p:spPr>
+            <a:xfrm flipV="1">
+              <a:off x="2216073" y="3267017"/>
+              <a:ext cx="726528" cy="685029"/>
+            </a:xfrm>
+            <a:prstGeom prst="straightConnector1">
+              <a:avLst/>
+            </a:prstGeom>
+            <a:ln w="38100">
+              <a:solidFill>
+                <a:srgbClr val="A3CEED"/>
+              </a:solidFill>
+              <a:tailEnd type="triangle"/>
+            </a:ln>
+          </p:spPr>
+          <p:style>
+            <a:lnRef idx="1">
+              <a:schemeClr val="accent1"/>
+            </a:lnRef>
+            <a:fillRef idx="0">
+              <a:schemeClr val="accent1"/>
+            </a:fillRef>
+            <a:effectRef idx="0">
+              <a:schemeClr val="accent1"/>
+            </a:effectRef>
+            <a:fontRef idx="minor">
+              <a:schemeClr val="tx1"/>
+            </a:fontRef>
+          </p:style>
+        </p:cxnSp>
+        <p:cxnSp>
+          <p:nvCxnSpPr>
+            <p:cNvPr id="20" name="Rechte verbindingslijn met pijl 19">
+              <a:extLst>
+                <a:ext uri="{FF2B5EF4-FFF2-40B4-BE49-F238E27FC236}">
+                  <a16:creationId xmlns:a16="http://schemas.microsoft.com/office/drawing/2014/main" id="{771B3678-9BD2-1F4C-B1FA-BBAC50BEC35E}"/>
+                </a:ext>
+              </a:extLst>
+            </p:cNvPr>
+            <p:cNvCxnSpPr>
+              <a:cxnSpLocks/>
+              <a:stCxn id="70" idx="3"/>
+              <a:endCxn id="58" idx="1"/>
+            </p:cNvCxnSpPr>
+            <p:nvPr/>
+          </p:nvCxnSpPr>
+          <p:spPr>
+            <a:xfrm>
+              <a:off x="2216073" y="3952046"/>
+              <a:ext cx="645256" cy="555474"/>
+            </a:xfrm>
+            <a:prstGeom prst="straightConnector1">
+              <a:avLst/>
+            </a:prstGeom>
+            <a:ln w="38100">
+              <a:solidFill>
+                <a:srgbClr val="A3CEED"/>
+              </a:solidFill>
+              <a:tailEnd type="triangle"/>
+            </a:ln>
+          </p:spPr>
+          <p:style>
+            <a:lnRef idx="1">
+              <a:schemeClr val="accent1"/>
+            </a:lnRef>
+            <a:fillRef idx="0">
+              <a:schemeClr val="accent1"/>
+            </a:fillRef>
+            <a:effectRef idx="0">
+              <a:schemeClr val="accent1"/>
+            </a:effectRef>
+            <a:fontRef idx="minor">
+              <a:schemeClr val="tx1"/>
+            </a:fontRef>
+          </p:style>
+        </p:cxnSp>
+        <p:cxnSp>
+          <p:nvCxnSpPr>
+            <p:cNvPr id="22" name="Rechte verbindingslijn met pijl 21">
+              <a:extLst>
+                <a:ext uri="{FF2B5EF4-FFF2-40B4-BE49-F238E27FC236}">
+                  <a16:creationId xmlns:a16="http://schemas.microsoft.com/office/drawing/2014/main" id="{66D640F8-63AD-2C45-A76B-8BC61E46A126}"/>
+                </a:ext>
+              </a:extLst>
+            </p:cNvPr>
+            <p:cNvCxnSpPr>
+              <a:cxnSpLocks/>
+              <a:stCxn id="13" idx="3"/>
+              <a:endCxn id="9" idx="1"/>
+            </p:cNvCxnSpPr>
+            <p:nvPr/>
+          </p:nvCxnSpPr>
+          <p:spPr>
+            <a:xfrm>
+              <a:off x="3825101" y="3267017"/>
+              <a:ext cx="726528" cy="616504"/>
+            </a:xfrm>
+            <a:prstGeom prst="straightConnector1">
+              <a:avLst/>
+            </a:prstGeom>
+            <a:ln w="38100">
+              <a:solidFill>
+                <a:srgbClr val="92D050"/>
+              </a:solidFill>
+              <a:tailEnd type="triangle"/>
+            </a:ln>
+          </p:spPr>
+          <p:style>
+            <a:lnRef idx="1">
+              <a:schemeClr val="accent1"/>
+            </a:lnRef>
+            <a:fillRef idx="0">
+              <a:schemeClr val="accent1"/>
+            </a:fillRef>
+            <a:effectRef idx="0">
+              <a:schemeClr val="accent1"/>
+            </a:effectRef>
+            <a:fontRef idx="minor">
+              <a:schemeClr val="tx1"/>
+            </a:fontRef>
+          </p:style>
+        </p:cxnSp>
+        <p:cxnSp>
+          <p:nvCxnSpPr>
+            <p:cNvPr id="27" name="Rechte verbindingslijn met pijl 26">
+              <a:extLst>
+                <a:ext uri="{FF2B5EF4-FFF2-40B4-BE49-F238E27FC236}">
+                  <a16:creationId xmlns:a16="http://schemas.microsoft.com/office/drawing/2014/main" id="{C5BA152F-1CB3-D749-B9D9-98340BC5385E}"/>
+                </a:ext>
+              </a:extLst>
+            </p:cNvPr>
+            <p:cNvCxnSpPr>
+              <a:cxnSpLocks/>
+              <a:stCxn id="58" idx="3"/>
+              <a:endCxn id="9" idx="1"/>
+            </p:cNvCxnSpPr>
+            <p:nvPr/>
+          </p:nvCxnSpPr>
+          <p:spPr>
+            <a:xfrm flipV="1">
+              <a:off x="3976991" y="3883521"/>
+              <a:ext cx="574638" cy="623999"/>
+            </a:xfrm>
+            <a:prstGeom prst="straightConnector1">
+              <a:avLst/>
+            </a:prstGeom>
+            <a:ln w="38100">
+              <a:solidFill>
+                <a:srgbClr val="92D050"/>
+              </a:solidFill>
+              <a:tailEnd type="triangle"/>
+            </a:ln>
+          </p:spPr>
+          <p:style>
+            <a:lnRef idx="1">
+              <a:schemeClr val="accent1"/>
+            </a:lnRef>
+            <a:fillRef idx="0">
+              <a:schemeClr val="accent1"/>
+            </a:fillRef>
+            <a:effectRef idx="0">
+              <a:schemeClr val="accent1"/>
+            </a:effectRef>
+            <a:fontRef idx="minor">
+              <a:schemeClr val="tx1"/>
+            </a:fontRef>
+          </p:style>
+        </p:cxnSp>
+        <p:cxnSp>
+          <p:nvCxnSpPr>
+            <p:cNvPr id="29" name="Rechte verbindingslijn met pijl 28">
+              <a:extLst>
+                <a:ext uri="{FF2B5EF4-FFF2-40B4-BE49-F238E27FC236}">
+                  <a16:creationId xmlns:a16="http://schemas.microsoft.com/office/drawing/2014/main" id="{24B6758A-CC65-144F-BF68-E426598A6E24}"/>
+                </a:ext>
+              </a:extLst>
+            </p:cNvPr>
+            <p:cNvCxnSpPr>
+              <a:cxnSpLocks/>
+              <a:stCxn id="9" idx="3"/>
+              <a:endCxn id="11" idx="1"/>
+            </p:cNvCxnSpPr>
+            <p:nvPr/>
+          </p:nvCxnSpPr>
+          <p:spPr>
+            <a:xfrm flipV="1">
+              <a:off x="5667291" y="3874915"/>
+              <a:ext cx="480391" cy="8606"/>
+            </a:xfrm>
+            <a:prstGeom prst="straightConnector1">
+              <a:avLst/>
+            </a:prstGeom>
+            <a:ln w="38100">
+              <a:solidFill>
+                <a:srgbClr val="92D050"/>
+              </a:solidFill>
+              <a:tailEnd type="triangle"/>
+            </a:ln>
+          </p:spPr>
+          <p:style>
+            <a:lnRef idx="1">
+              <a:schemeClr val="accent1"/>
+            </a:lnRef>
+            <a:fillRef idx="0">
+              <a:schemeClr val="accent1"/>
+            </a:fillRef>
+            <a:effectRef idx="0">
+              <a:schemeClr val="accent1"/>
+            </a:effectRef>
+            <a:fontRef idx="minor">
+              <a:schemeClr val="tx1"/>
+            </a:fontRef>
+          </p:style>
+        </p:cxnSp>
+        <p:cxnSp>
+          <p:nvCxnSpPr>
+            <p:cNvPr id="33" name="Rechte verbindingslijn met pijl 32">
+              <a:extLst>
+                <a:ext uri="{FF2B5EF4-FFF2-40B4-BE49-F238E27FC236}">
+                  <a16:creationId xmlns:a16="http://schemas.microsoft.com/office/drawing/2014/main" id="{4D059303-2E61-7544-B222-87438E8DCB3D}"/>
+                </a:ext>
+              </a:extLst>
+            </p:cNvPr>
+            <p:cNvCxnSpPr>
+              <a:cxnSpLocks/>
+              <a:stCxn id="11" idx="3"/>
+              <a:endCxn id="5" idx="1"/>
+            </p:cNvCxnSpPr>
+            <p:nvPr/>
+          </p:nvCxnSpPr>
+          <p:spPr>
+            <a:xfrm>
+              <a:off x="7263344" y="3874915"/>
+              <a:ext cx="480391" cy="8607"/>
+            </a:xfrm>
+            <a:prstGeom prst="straightConnector1">
+              <a:avLst/>
+            </a:prstGeom>
+            <a:ln w="38100">
+              <a:solidFill>
+                <a:srgbClr val="92D050"/>
+              </a:solidFill>
+              <a:tailEnd type="triangle"/>
+            </a:ln>
+          </p:spPr>
+          <p:style>
+            <a:lnRef idx="1">
+              <a:schemeClr val="accent1"/>
+            </a:lnRef>
+            <a:fillRef idx="0">
+              <a:schemeClr val="accent1"/>
+            </a:fillRef>
+            <a:effectRef idx="0">
+              <a:schemeClr val="accent1"/>
+            </a:effectRef>
+            <a:fontRef idx="minor">
+              <a:schemeClr val="tx1"/>
+            </a:fontRef>
+          </p:style>
+        </p:cxnSp>
+        <p:cxnSp>
+          <p:nvCxnSpPr>
+            <p:cNvPr id="36" name="Rechte verbindingslijn met pijl 35">
+              <a:extLst>
+                <a:ext uri="{FF2B5EF4-FFF2-40B4-BE49-F238E27FC236}">
+                  <a16:creationId xmlns:a16="http://schemas.microsoft.com/office/drawing/2014/main" id="{51E1A51D-C1F3-8546-9E81-FF388BDDA652}"/>
+                </a:ext>
+              </a:extLst>
+            </p:cNvPr>
+            <p:cNvCxnSpPr>
+              <a:cxnSpLocks/>
+              <a:stCxn id="5" idx="3"/>
+              <a:endCxn id="17" idx="1"/>
+            </p:cNvCxnSpPr>
+            <p:nvPr/>
+          </p:nvCxnSpPr>
+          <p:spPr>
+            <a:xfrm>
+              <a:off x="8769008" y="3883522"/>
+              <a:ext cx="480391" cy="0"/>
+            </a:xfrm>
+            <a:prstGeom prst="straightConnector1">
+              <a:avLst/>
+            </a:prstGeom>
+            <a:ln w="38100">
+              <a:solidFill>
+                <a:srgbClr val="92D050"/>
+              </a:solidFill>
+              <a:tailEnd type="triangle"/>
+            </a:ln>
+          </p:spPr>
+          <p:style>
+            <a:lnRef idx="1">
+              <a:schemeClr val="accent1"/>
+            </a:lnRef>
+            <a:fillRef idx="0">
+              <a:schemeClr val="accent1"/>
+            </a:fillRef>
+            <a:effectRef idx="0">
+              <a:schemeClr val="accent1"/>
+            </a:effectRef>
+            <a:fontRef idx="minor">
+              <a:schemeClr val="tx1"/>
+            </a:fontRef>
+          </p:style>
+        </p:cxnSp>
+        <p:cxnSp>
+          <p:nvCxnSpPr>
+            <p:cNvPr id="39" name="Rechte verbindingslijn met pijl 38">
+              <a:extLst>
+                <a:ext uri="{FF2B5EF4-FFF2-40B4-BE49-F238E27FC236}">
+                  <a16:creationId xmlns:a16="http://schemas.microsoft.com/office/drawing/2014/main" id="{0D9D22EE-C828-2540-A75B-6102A0F24953}"/>
+                </a:ext>
+              </a:extLst>
+            </p:cNvPr>
+            <p:cNvCxnSpPr>
+              <a:cxnSpLocks/>
+              <a:stCxn id="17" idx="3"/>
+              <a:endCxn id="15" idx="1"/>
+            </p:cNvCxnSpPr>
+            <p:nvPr/>
+          </p:nvCxnSpPr>
+          <p:spPr>
+            <a:xfrm flipV="1">
+              <a:off x="10492300" y="3877465"/>
+              <a:ext cx="416113" cy="6057"/>
+            </a:xfrm>
+            <a:prstGeom prst="straightConnector1">
+              <a:avLst/>
+            </a:prstGeom>
+            <a:ln w="38100">
+              <a:solidFill>
+                <a:srgbClr val="DDAEEF"/>
+              </a:solidFill>
+              <a:tailEnd type="triangle"/>
+            </a:ln>
+          </p:spPr>
+          <p:style>
+            <a:lnRef idx="1">
+              <a:schemeClr val="accent1"/>
+            </a:lnRef>
+            <a:fillRef idx="0">
+              <a:schemeClr val="accent1"/>
+            </a:fillRef>
+            <a:effectRef idx="0">
+              <a:schemeClr val="accent1"/>
+            </a:effectRef>
+            <a:fontRef idx="minor">
+              <a:schemeClr val="tx1"/>
+            </a:fontRef>
+          </p:style>
+        </p:cxnSp>
+        <p:pic>
+          <p:nvPicPr>
+            <p:cNvPr id="58" name="Afbeelding 57">
+              <a:extLst>
+                <a:ext uri="{FF2B5EF4-FFF2-40B4-BE49-F238E27FC236}">
+                  <a16:creationId xmlns:a16="http://schemas.microsoft.com/office/drawing/2014/main" id="{24C5C453-C3AA-6E49-B9FA-76E822F06E49}"/>
+                </a:ext>
+              </a:extLst>
+            </p:cNvPr>
+            <p:cNvPicPr>
+              <a:picLocks noChangeAspect="1"/>
+            </p:cNvPicPr>
+            <p:nvPr/>
+          </p:nvPicPr>
+          <p:blipFill>
+            <a:blip r:embed="rId9"/>
+            <a:stretch>
+              <a:fillRect/>
+            </a:stretch>
+          </p:blipFill>
+          <p:spPr>
+            <a:xfrm>
+              <a:off x="2861329" y="3949689"/>
+              <a:ext cx="1115662" cy="1115662"/>
+            </a:xfrm>
+            <a:prstGeom prst="rect">
+              <a:avLst/>
+            </a:prstGeom>
+          </p:spPr>
+        </p:pic>
+        <p:grpSp>
+          <p:nvGrpSpPr>
+            <p:cNvPr id="86" name="Groep 85">
+              <a:extLst>
+                <a:ext uri="{FF2B5EF4-FFF2-40B4-BE49-F238E27FC236}">
+                  <a16:creationId xmlns:a16="http://schemas.microsoft.com/office/drawing/2014/main" id="{CD06E20D-2BF0-9A41-AB66-7C40A2B591BF}"/>
+                </a:ext>
+              </a:extLst>
+            </p:cNvPr>
+            <p:cNvGrpSpPr/>
+            <p:nvPr/>
+          </p:nvGrpSpPr>
+          <p:grpSpPr>
+            <a:xfrm>
+              <a:off x="810832" y="2822574"/>
+              <a:ext cx="1405241" cy="2121894"/>
+              <a:chOff x="2571750" y="161026"/>
+              <a:chExt cx="1405241" cy="2121894"/>
+            </a:xfrm>
+          </p:grpSpPr>
+          <p:pic>
+            <p:nvPicPr>
+              <p:cNvPr id="7" name="Afbeelding 6">
+                <a:extLst>
+                  <a:ext uri="{FF2B5EF4-FFF2-40B4-BE49-F238E27FC236}">
+                    <a16:creationId xmlns:a16="http://schemas.microsoft.com/office/drawing/2014/main" id="{B2D0EE48-7E3F-5D49-84FF-655430012CDE}"/>
+                  </a:ext>
+                </a:extLst>
+              </p:cNvPr>
+              <p:cNvPicPr>
+                <a:picLocks noChangeAspect="1"/>
+              </p:cNvPicPr>
+              <p:nvPr/>
+            </p:nvPicPr>
+            <p:blipFill>
+              <a:blip r:embed="rId10"/>
+              <a:stretch>
+                <a:fillRect/>
+              </a:stretch>
+            </p:blipFill>
+            <p:spPr>
+              <a:xfrm>
+                <a:off x="2822614" y="1276688"/>
+                <a:ext cx="1002487" cy="1002487"/>
+              </a:xfrm>
+              <a:prstGeom prst="rect">
+                <a:avLst/>
+              </a:prstGeom>
+            </p:spPr>
+          </p:pic>
+          <p:pic>
+            <p:nvPicPr>
+              <p:cNvPr id="56" name="Afbeelding 55">
+                <a:extLst>
+                  <a:ext uri="{FF2B5EF4-FFF2-40B4-BE49-F238E27FC236}">
+                    <a16:creationId xmlns:a16="http://schemas.microsoft.com/office/drawing/2014/main" id="{8E5B2EB0-198C-AA45-B8D0-C9F5EB8BDDCB}"/>
+                  </a:ext>
+                </a:extLst>
+              </p:cNvPr>
+              <p:cNvPicPr>
+                <a:picLocks noChangeAspect="1"/>
+              </p:cNvPicPr>
+              <p:nvPr/>
+            </p:nvPicPr>
+            <p:blipFill>
+              <a:blip r:embed="rId11"/>
+              <a:stretch>
+                <a:fillRect/>
+              </a:stretch>
+            </p:blipFill>
+            <p:spPr>
+              <a:xfrm>
+                <a:off x="2716539" y="161026"/>
+                <a:ext cx="1115662" cy="1115662"/>
+              </a:xfrm>
+              <a:prstGeom prst="rect">
+                <a:avLst/>
+              </a:prstGeom>
+            </p:spPr>
+          </p:pic>
+          <p:sp>
+            <p:nvSpPr>
+              <p:cNvPr id="70" name="Rechthoek 69">
+                <a:extLst>
+                  <a:ext uri="{FF2B5EF4-FFF2-40B4-BE49-F238E27FC236}">
+                    <a16:creationId xmlns:a16="http://schemas.microsoft.com/office/drawing/2014/main" id="{2C370F0A-D809-9845-BFEB-761B4444147F}"/>
+                  </a:ext>
+                </a:extLst>
+              </p:cNvPr>
+              <p:cNvSpPr/>
+              <p:nvPr/>
+            </p:nvSpPr>
+            <p:spPr>
+              <a:xfrm>
+                <a:off x="2571750" y="298076"/>
+                <a:ext cx="1405241" cy="1984844"/>
+              </a:xfrm>
+              <a:prstGeom prst="rect">
+                <a:avLst/>
+              </a:prstGeom>
+              <a:noFill/>
+            </p:spPr>
+            <p:style>
+              <a:lnRef idx="2">
+                <a:schemeClr val="dk1"/>
+              </a:lnRef>
+              <a:fillRef idx="1">
+                <a:schemeClr val="lt1"/>
+              </a:fillRef>
+              <a:effectRef idx="0">
+                <a:schemeClr val="dk1"/>
+              </a:effectRef>
+              <a:fontRef idx="minor">
+                <a:schemeClr val="dk1"/>
+              </a:fontRef>
+            </p:style>
+            <p:txBody>
+              <a:bodyPr rtlCol="0" anchor="ctr"/>
+              <a:lstStyle/>
+              <a:p>
+                <a:pPr algn="ctr"/>
+                <a:endParaRPr lang="nl-NL"/>
+              </a:p>
+            </p:txBody>
+          </p:sp>
+        </p:grpSp>
+        <p:sp>
+          <p:nvSpPr>
+            <p:cNvPr id="91" name="Tekstvak 90">
+              <a:extLst>
+                <a:ext uri="{FF2B5EF4-FFF2-40B4-BE49-F238E27FC236}">
+                  <a16:creationId xmlns:a16="http://schemas.microsoft.com/office/drawing/2014/main" id="{281392B0-8A87-AC43-84C6-1060C07D339F}"/>
+                </a:ext>
+              </a:extLst>
+            </p:cNvPr>
+            <p:cNvSpPr txBox="1"/>
+            <p:nvPr/>
+          </p:nvSpPr>
+          <p:spPr>
+            <a:xfrm>
+              <a:off x="831902" y="5101992"/>
+              <a:ext cx="1359668" cy="276999"/>
+            </a:xfrm>
+            <a:prstGeom prst="rect">
+              <a:avLst/>
+            </a:prstGeom>
+            <a:noFill/>
+          </p:spPr>
+          <p:txBody>
+            <a:bodyPr wrap="none" rtlCol="0">
+              <a:spAutoFit/>
+            </a:bodyPr>
+            <a:lstStyle/>
+            <a:p>
+              <a:r>
+                <a:rPr lang="nl-NL" sz="1200" dirty="0">
+                  <a:latin typeface="Avenir Book" panose="02000503020000020003" pitchFamily="2" charset="0"/>
+                </a:rPr>
+                <a:t>Input parameters</a:t>
+              </a:r>
+            </a:p>
+          </p:txBody>
+        </p:sp>
+        <p:sp>
+          <p:nvSpPr>
+            <p:cNvPr id="92" name="Tekstvak 91">
+              <a:extLst>
+                <a:ext uri="{FF2B5EF4-FFF2-40B4-BE49-F238E27FC236}">
+                  <a16:creationId xmlns:a16="http://schemas.microsoft.com/office/drawing/2014/main" id="{EB95619E-6A21-6241-BED1-43A50B2637A7}"/>
+                </a:ext>
+              </a:extLst>
+            </p:cNvPr>
+            <p:cNvSpPr txBox="1"/>
+            <p:nvPr/>
+          </p:nvSpPr>
+          <p:spPr>
+            <a:xfrm>
+              <a:off x="2729154" y="3690479"/>
+              <a:ext cx="1299202" cy="276999"/>
+            </a:xfrm>
+            <a:prstGeom prst="rect">
+              <a:avLst/>
+            </a:prstGeom>
+            <a:noFill/>
+          </p:spPr>
+          <p:txBody>
+            <a:bodyPr wrap="none" rtlCol="0">
+              <a:spAutoFit/>
+            </a:bodyPr>
+            <a:lstStyle/>
+            <a:p>
+              <a:r>
+                <a:rPr lang="nl-NL" sz="1200" dirty="0" err="1">
+                  <a:latin typeface="Avenir Book" panose="02000503020000020003" pitchFamily="2" charset="0"/>
+                </a:rPr>
+                <a:t>Create_mesh.py</a:t>
+              </a:r>
+              <a:endParaRPr lang="nl-NL" sz="1200" dirty="0">
+                <a:latin typeface="Avenir Book" panose="02000503020000020003" pitchFamily="2" charset="0"/>
+              </a:endParaRPr>
+            </a:p>
+          </p:txBody>
+        </p:sp>
+        <p:sp>
+          <p:nvSpPr>
+            <p:cNvPr id="93" name="Tekstvak 92">
+              <a:extLst>
+                <a:ext uri="{FF2B5EF4-FFF2-40B4-BE49-F238E27FC236}">
+                  <a16:creationId xmlns:a16="http://schemas.microsoft.com/office/drawing/2014/main" id="{0A8DB067-B20B-B747-B17D-0F74F790C337}"/>
+                </a:ext>
+              </a:extLst>
+            </p:cNvPr>
+            <p:cNvSpPr txBox="1"/>
+            <p:nvPr/>
+          </p:nvSpPr>
+          <p:spPr>
+            <a:xfrm>
+              <a:off x="2579337" y="5065351"/>
+              <a:ext cx="1786066" cy="276999"/>
+            </a:xfrm>
+            <a:prstGeom prst="rect">
+              <a:avLst/>
+            </a:prstGeom>
+            <a:noFill/>
+          </p:spPr>
+          <p:txBody>
+            <a:bodyPr wrap="none" rtlCol="0">
+              <a:spAutoFit/>
+            </a:bodyPr>
+            <a:lstStyle/>
+            <a:p>
+              <a:r>
+                <a:rPr lang="nl-NL" sz="1200" dirty="0" err="1">
+                  <a:latin typeface="Avenir Book" panose="02000503020000020003" pitchFamily="2" charset="0"/>
+                </a:rPr>
+                <a:t>Bloodflow_functions.py</a:t>
+              </a:r>
+              <a:endParaRPr lang="nl-NL" sz="1200" dirty="0">
+                <a:latin typeface="Avenir Book" panose="02000503020000020003" pitchFamily="2" charset="0"/>
+              </a:endParaRPr>
+            </a:p>
+          </p:txBody>
+        </p:sp>
+        <p:sp>
+          <p:nvSpPr>
+            <p:cNvPr id="95" name="Tekstvak 94">
+              <a:extLst>
+                <a:ext uri="{FF2B5EF4-FFF2-40B4-BE49-F238E27FC236}">
+                  <a16:creationId xmlns:a16="http://schemas.microsoft.com/office/drawing/2014/main" id="{54D93350-2E83-1A4F-B982-D01AA4C2D60E}"/>
+                </a:ext>
+              </a:extLst>
+            </p:cNvPr>
+            <p:cNvSpPr txBox="1"/>
+            <p:nvPr/>
+          </p:nvSpPr>
+          <p:spPr>
+            <a:xfrm>
+              <a:off x="4340684" y="4500025"/>
+              <a:ext cx="1503938" cy="276999"/>
+            </a:xfrm>
+            <a:prstGeom prst="rect">
+              <a:avLst/>
+            </a:prstGeom>
+            <a:noFill/>
+          </p:spPr>
+          <p:txBody>
+            <a:bodyPr wrap="none" rtlCol="0">
+              <a:spAutoFit/>
+            </a:bodyPr>
+            <a:lstStyle/>
+            <a:p>
+              <a:r>
+                <a:rPr lang="nl-NL" sz="1200" dirty="0">
+                  <a:latin typeface="Avenir Book" panose="02000503020000020003" pitchFamily="2" charset="0"/>
+                </a:rPr>
+                <a:t>Openfoam-macos9</a:t>
+              </a:r>
+            </a:p>
+          </p:txBody>
+        </p:sp>
+        <p:sp>
+          <p:nvSpPr>
+            <p:cNvPr id="96" name="Tekstvak 95">
+              <a:extLst>
+                <a:ext uri="{FF2B5EF4-FFF2-40B4-BE49-F238E27FC236}">
+                  <a16:creationId xmlns:a16="http://schemas.microsoft.com/office/drawing/2014/main" id="{D2D8B611-93C6-B049-A0BB-475417C824AF}"/>
+                </a:ext>
+              </a:extLst>
+            </p:cNvPr>
+            <p:cNvSpPr txBox="1"/>
+            <p:nvPr/>
+          </p:nvSpPr>
+          <p:spPr>
+            <a:xfrm>
+              <a:off x="6227278" y="4507520"/>
+              <a:ext cx="1087157" cy="461665"/>
+            </a:xfrm>
+            <a:prstGeom prst="rect">
+              <a:avLst/>
+            </a:prstGeom>
+            <a:noFill/>
+          </p:spPr>
+          <p:txBody>
+            <a:bodyPr wrap="none" rtlCol="0">
+              <a:spAutoFit/>
+            </a:bodyPr>
+            <a:lstStyle/>
+            <a:p>
+              <a:r>
+                <a:rPr lang="nl-NL" sz="1200" dirty="0">
+                  <a:latin typeface="Avenir Book" panose="02000503020000020003" pitchFamily="2" charset="0"/>
+                </a:rPr>
+                <a:t>Run/constant</a:t>
+              </a:r>
+            </a:p>
+            <a:p>
+              <a:r>
+                <a:rPr lang="nl-NL" sz="1200" dirty="0">
+                  <a:latin typeface="Avenir Book" panose="02000503020000020003" pitchFamily="2" charset="0"/>
+                </a:rPr>
+                <a:t>Run/0</a:t>
+              </a:r>
+            </a:p>
+          </p:txBody>
+        </p:sp>
+        <p:sp>
+          <p:nvSpPr>
+            <p:cNvPr id="97" name="Tekstvak 96">
+              <a:extLst>
+                <a:ext uri="{FF2B5EF4-FFF2-40B4-BE49-F238E27FC236}">
+                  <a16:creationId xmlns:a16="http://schemas.microsoft.com/office/drawing/2014/main" id="{80F8DAB7-D848-E746-8505-CB6350464307}"/>
+                </a:ext>
+              </a:extLst>
+            </p:cNvPr>
+            <p:cNvSpPr txBox="1"/>
+            <p:nvPr/>
+          </p:nvSpPr>
+          <p:spPr>
+            <a:xfrm>
+              <a:off x="7869085" y="4507520"/>
+              <a:ext cx="774571" cy="276999"/>
+            </a:xfrm>
+            <a:prstGeom prst="rect">
+              <a:avLst/>
+            </a:prstGeom>
+            <a:noFill/>
+          </p:spPr>
+          <p:txBody>
+            <a:bodyPr wrap="none" rtlCol="0">
+              <a:spAutoFit/>
+            </a:bodyPr>
+            <a:lstStyle/>
+            <a:p>
+              <a:r>
+                <a:rPr lang="nl-NL" sz="1200" dirty="0" err="1">
+                  <a:latin typeface="Avenir Book" panose="02000503020000020003" pitchFamily="2" charset="0"/>
+                </a:rPr>
+                <a:t>icoFoam</a:t>
+              </a:r>
+              <a:endParaRPr lang="nl-NL" sz="1200" dirty="0">
+                <a:latin typeface="Avenir Book" panose="02000503020000020003" pitchFamily="2" charset="0"/>
+              </a:endParaRPr>
+            </a:p>
+          </p:txBody>
+        </p:sp>
+        <p:sp>
+          <p:nvSpPr>
+            <p:cNvPr id="98" name="Tekstvak 97">
+              <a:extLst>
+                <a:ext uri="{FF2B5EF4-FFF2-40B4-BE49-F238E27FC236}">
+                  <a16:creationId xmlns:a16="http://schemas.microsoft.com/office/drawing/2014/main" id="{37CC2348-4F89-F649-8284-B818FE03C972}"/>
+                </a:ext>
+              </a:extLst>
+            </p:cNvPr>
+            <p:cNvSpPr txBox="1"/>
+            <p:nvPr/>
+          </p:nvSpPr>
+          <p:spPr>
+            <a:xfrm>
+              <a:off x="9315303" y="4507520"/>
+              <a:ext cx="1146468" cy="276999"/>
+            </a:xfrm>
+            <a:prstGeom prst="rect">
+              <a:avLst/>
+            </a:prstGeom>
+            <a:noFill/>
+          </p:spPr>
+          <p:txBody>
+            <a:bodyPr wrap="none" rtlCol="0">
+              <a:spAutoFit/>
+            </a:bodyPr>
+            <a:lstStyle/>
+            <a:p>
+              <a:r>
+                <a:rPr lang="nl-NL" sz="1200" dirty="0" err="1">
+                  <a:latin typeface="Avenir Book" panose="02000503020000020003" pitchFamily="2" charset="0"/>
+                </a:rPr>
+                <a:t>VTKtoPNG.py</a:t>
+              </a:r>
+              <a:endParaRPr lang="nl-NL" sz="1200" dirty="0">
+                <a:latin typeface="Avenir Book" panose="02000503020000020003" pitchFamily="2" charset="0"/>
+              </a:endParaRPr>
+            </a:p>
+          </p:txBody>
+        </p:sp>
+        <p:sp>
+          <p:nvSpPr>
+            <p:cNvPr id="100" name="Tekstvak 99">
+              <a:extLst>
+                <a:ext uri="{FF2B5EF4-FFF2-40B4-BE49-F238E27FC236}">
+                  <a16:creationId xmlns:a16="http://schemas.microsoft.com/office/drawing/2014/main" id="{BC00F222-1839-A04C-BA1E-476AF5A12548}"/>
+                </a:ext>
+              </a:extLst>
+            </p:cNvPr>
+            <p:cNvSpPr txBox="1"/>
+            <p:nvPr/>
+          </p:nvSpPr>
+          <p:spPr>
+            <a:xfrm>
+              <a:off x="10713933" y="4497610"/>
+              <a:ext cx="1176476" cy="276999"/>
+            </a:xfrm>
+            <a:prstGeom prst="rect">
+              <a:avLst/>
+            </a:prstGeom>
+            <a:noFill/>
+          </p:spPr>
+          <p:txBody>
+            <a:bodyPr wrap="none" rtlCol="0">
+              <a:spAutoFit/>
+            </a:bodyPr>
+            <a:lstStyle/>
+            <a:p>
+              <a:r>
+                <a:rPr lang="nl-NL" sz="1200" dirty="0">
+                  <a:latin typeface="Avenir Book" panose="02000503020000020003" pitchFamily="2" charset="0"/>
+                </a:rPr>
+                <a:t>Output format</a:t>
+              </a:r>
+            </a:p>
+          </p:txBody>
+        </p:sp>
+      </p:grpSp>
+    </p:spTree>
+    <p:extLst>
+      <p:ext uri="{BB962C8B-B14F-4D97-AF65-F5344CB8AC3E}">
+        <p14:creationId xmlns:p14="http://schemas.microsoft.com/office/powerpoint/2010/main" val="3776690871"/>
+      </p:ext>
+    </p:extLst>
+  </p:cSld>
+  <p:clrMapOvr>
+    <a:masterClrMapping/>
+  </p:clrMapOvr>
+</p:sld>
+</file>
+
 <file path=ppt/theme/theme1.xml><?xml version="1.0" encoding="utf-8"?>
 <a:theme xmlns:a="http://schemas.openxmlformats.org/drawingml/2006/main" name="Kantoorthema">
   <a:themeElements>

</xml_diff>

<commit_message>
trying out data_pipeline bash script
</commit_message>
<xml_diff>
--- a/Report/images/ppt_for_editing.pptx
+++ b/Report/images/ppt_for_editing.pptx
@@ -12,6 +12,7 @@
     <p:sldId id="260" r:id="rId6"/>
     <p:sldId id="261" r:id="rId7"/>
     <p:sldId id="262" r:id="rId8"/>
+    <p:sldId id="263" r:id="rId9"/>
   </p:sldIdLst>
   <p:sldSz cx="12192000" cy="6858000"/>
   <p:notesSz cx="6858000" cy="9144000"/>
@@ -265,7 +266,7 @@
           <a:p>
             <a:fld id="{15F5C6DF-5D78-8146-8AF0-DC13752353FA}" type="datetimeFigureOut">
               <a:rPr lang="nl-NL" smtClean="0"/>
-              <a:t>10-03-2022</a:t>
+              <a:t>22-03-2022</a:t>
             </a:fld>
             <a:endParaRPr lang="nl-NL"/>
           </a:p>
@@ -463,7 +464,7 @@
           <a:p>
             <a:fld id="{15F5C6DF-5D78-8146-8AF0-DC13752353FA}" type="datetimeFigureOut">
               <a:rPr lang="nl-NL" smtClean="0"/>
-              <a:t>10-03-2022</a:t>
+              <a:t>22-03-2022</a:t>
             </a:fld>
             <a:endParaRPr lang="nl-NL"/>
           </a:p>
@@ -671,7 +672,7 @@
           <a:p>
             <a:fld id="{15F5C6DF-5D78-8146-8AF0-DC13752353FA}" type="datetimeFigureOut">
               <a:rPr lang="nl-NL" smtClean="0"/>
-              <a:t>10-03-2022</a:t>
+              <a:t>22-03-2022</a:t>
             </a:fld>
             <a:endParaRPr lang="nl-NL"/>
           </a:p>
@@ -869,7 +870,7 @@
           <a:p>
             <a:fld id="{15F5C6DF-5D78-8146-8AF0-DC13752353FA}" type="datetimeFigureOut">
               <a:rPr lang="nl-NL" smtClean="0"/>
-              <a:t>10-03-2022</a:t>
+              <a:t>22-03-2022</a:t>
             </a:fld>
             <a:endParaRPr lang="nl-NL"/>
           </a:p>
@@ -1144,7 +1145,7 @@
           <a:p>
             <a:fld id="{15F5C6DF-5D78-8146-8AF0-DC13752353FA}" type="datetimeFigureOut">
               <a:rPr lang="nl-NL" smtClean="0"/>
-              <a:t>10-03-2022</a:t>
+              <a:t>22-03-2022</a:t>
             </a:fld>
             <a:endParaRPr lang="nl-NL"/>
           </a:p>
@@ -1409,7 +1410,7 @@
           <a:p>
             <a:fld id="{15F5C6DF-5D78-8146-8AF0-DC13752353FA}" type="datetimeFigureOut">
               <a:rPr lang="nl-NL" smtClean="0"/>
-              <a:t>10-03-2022</a:t>
+              <a:t>22-03-2022</a:t>
             </a:fld>
             <a:endParaRPr lang="nl-NL"/>
           </a:p>
@@ -1821,7 +1822,7 @@
           <a:p>
             <a:fld id="{15F5C6DF-5D78-8146-8AF0-DC13752353FA}" type="datetimeFigureOut">
               <a:rPr lang="nl-NL" smtClean="0"/>
-              <a:t>10-03-2022</a:t>
+              <a:t>22-03-2022</a:t>
             </a:fld>
             <a:endParaRPr lang="nl-NL"/>
           </a:p>
@@ -1962,7 +1963,7 @@
           <a:p>
             <a:fld id="{15F5C6DF-5D78-8146-8AF0-DC13752353FA}" type="datetimeFigureOut">
               <a:rPr lang="nl-NL" smtClean="0"/>
-              <a:t>10-03-2022</a:t>
+              <a:t>22-03-2022</a:t>
             </a:fld>
             <a:endParaRPr lang="nl-NL"/>
           </a:p>
@@ -2075,7 +2076,7 @@
           <a:p>
             <a:fld id="{15F5C6DF-5D78-8146-8AF0-DC13752353FA}" type="datetimeFigureOut">
               <a:rPr lang="nl-NL" smtClean="0"/>
-              <a:t>10-03-2022</a:t>
+              <a:t>22-03-2022</a:t>
             </a:fld>
             <a:endParaRPr lang="nl-NL"/>
           </a:p>
@@ -2386,7 +2387,7 @@
           <a:p>
             <a:fld id="{15F5C6DF-5D78-8146-8AF0-DC13752353FA}" type="datetimeFigureOut">
               <a:rPr lang="nl-NL" smtClean="0"/>
-              <a:t>10-03-2022</a:t>
+              <a:t>22-03-2022</a:t>
             </a:fld>
             <a:endParaRPr lang="nl-NL"/>
           </a:p>
@@ -2674,7 +2675,7 @@
           <a:p>
             <a:fld id="{15F5C6DF-5D78-8146-8AF0-DC13752353FA}" type="datetimeFigureOut">
               <a:rPr lang="nl-NL" smtClean="0"/>
-              <a:t>10-03-2022</a:t>
+              <a:t>22-03-2022</a:t>
             </a:fld>
             <a:endParaRPr lang="nl-NL"/>
           </a:p>
@@ -2915,7 +2916,7 @@
           <a:p>
             <a:fld id="{15F5C6DF-5D78-8146-8AF0-DC13752353FA}" type="datetimeFigureOut">
               <a:rPr lang="nl-NL" smtClean="0"/>
-              <a:t>10-03-2022</a:t>
+              <a:t>22-03-2022</a:t>
             </a:fld>
             <a:endParaRPr lang="nl-NL"/>
           </a:p>
@@ -13805,6 +13806,397 @@
 </p:sld>
 </file>
 
+<file path=ppt/slides/slide8.xml><?xml version="1.0" encoding="utf-8"?>
+<p:sld xmlns:a="http://schemas.openxmlformats.org/drawingml/2006/main" xmlns:r="http://schemas.openxmlformats.org/officeDocument/2006/relationships" xmlns:p="http://schemas.openxmlformats.org/presentationml/2006/main">
+  <p:cSld>
+    <p:spTree>
+      <p:nvGrpSpPr>
+        <p:cNvPr id="1" name=""/>
+        <p:cNvGrpSpPr/>
+        <p:nvPr/>
+      </p:nvGrpSpPr>
+      <p:grpSpPr>
+        <a:xfrm>
+          <a:off x="0" y="0"/>
+          <a:ext cx="0" cy="0"/>
+          <a:chOff x="0" y="0"/>
+          <a:chExt cx="0" cy="0"/>
+        </a:xfrm>
+      </p:grpSpPr>
+      <p:pic>
+        <p:nvPicPr>
+          <p:cNvPr id="5" name="Tijdelijke aanduiding voor inhoud 4">
+            <a:extLst>
+              <a:ext uri="{FF2B5EF4-FFF2-40B4-BE49-F238E27FC236}">
+                <a16:creationId xmlns:a16="http://schemas.microsoft.com/office/drawing/2014/main" id="{4598B8A1-EB0E-8845-B55A-C5D4C7A6E05C}"/>
+              </a:ext>
+            </a:extLst>
+          </p:cNvPr>
+          <p:cNvPicPr>
+            <a:picLocks noGrp="1" noChangeAspect="1"/>
+          </p:cNvPicPr>
+          <p:nvPr>
+            <p:ph idx="1"/>
+          </p:nvPr>
+        </p:nvPicPr>
+        <p:blipFill rotWithShape="1">
+          <a:blip r:embed="rId2">
+            <a:extLst>
+              <a:ext uri="{BEBA8EAE-BF5A-486C-A8C5-ECC9F3942E4B}">
+                <a14:imgProps xmlns:a14="http://schemas.microsoft.com/office/drawing/2010/main">
+                  <a14:imgLayer r:embed="rId3">
+                    <a14:imgEffect>
+                      <a14:backgroundRemoval t="4447" b="96496" l="25000" r="78831">
+                        <a14:foregroundMark x1="46371" y1="89488" x2="40121" y2="94474"/>
+                        <a14:foregroundMark x1="40121" y1="94474" x2="46774" y2="89084"/>
+                        <a14:foregroundMark x1="46774" y1="89084" x2="55444" y2="88814"/>
+                        <a14:foregroundMark x1="55444" y1="88814" x2="60887" y2="93935"/>
+                        <a14:foregroundMark x1="60887" y1="93935" x2="57056" y2="96496"/>
+                        <a14:foregroundMark x1="50202" y1="11456" x2="48387" y2="4447"/>
+                        <a14:backgroundMark x1="53629" y1="85714" x2="54637" y2="86253"/>
+                      </a14:backgroundRemoval>
+                    </a14:imgEffect>
+                  </a14:imgLayer>
+                </a14:imgProps>
+              </a:ext>
+            </a:extLst>
+          </a:blip>
+          <a:srcRect l="18374" r="14218"/>
+          <a:stretch/>
+        </p:blipFill>
+        <p:spPr>
+          <a:xfrm>
+            <a:off x="1684355" y="439015"/>
+            <a:ext cx="3641689" cy="4959715"/>
+          </a:xfrm>
+        </p:spPr>
+      </p:pic>
+      <p:grpSp>
+        <p:nvGrpSpPr>
+          <p:cNvPr id="19" name="Groep 18">
+            <a:extLst>
+              <a:ext uri="{FF2B5EF4-FFF2-40B4-BE49-F238E27FC236}">
+                <a16:creationId xmlns:a16="http://schemas.microsoft.com/office/drawing/2014/main" id="{AA706255-455B-E047-90A1-FBA7A6DE2D68}"/>
+              </a:ext>
+            </a:extLst>
+          </p:cNvPr>
+          <p:cNvGrpSpPr/>
+          <p:nvPr/>
+        </p:nvGrpSpPr>
+        <p:grpSpPr>
+          <a:xfrm>
+            <a:off x="3448048" y="499561"/>
+            <a:ext cx="1418138" cy="4229645"/>
+            <a:chOff x="3505200" y="556316"/>
+            <a:chExt cx="1191711" cy="5292034"/>
+          </a:xfrm>
+        </p:grpSpPr>
+        <p:cxnSp>
+          <p:nvCxnSpPr>
+            <p:cNvPr id="4" name="Rechte verbindingslijn 3">
+              <a:extLst>
+                <a:ext uri="{FF2B5EF4-FFF2-40B4-BE49-F238E27FC236}">
+                  <a16:creationId xmlns:a16="http://schemas.microsoft.com/office/drawing/2014/main" id="{24D0D6A0-B93D-B042-96AD-D850720746A5}"/>
+                </a:ext>
+              </a:extLst>
+            </p:cNvPr>
+            <p:cNvCxnSpPr>
+              <a:cxnSpLocks/>
+            </p:cNvCxnSpPr>
+            <p:nvPr/>
+          </p:nvCxnSpPr>
+          <p:spPr>
+            <a:xfrm flipV="1">
+              <a:off x="3818838" y="919264"/>
+              <a:ext cx="490839" cy="261043"/>
+            </a:xfrm>
+            <a:prstGeom prst="line">
+              <a:avLst/>
+            </a:prstGeom>
+          </p:spPr>
+          <p:style>
+            <a:lnRef idx="1">
+              <a:schemeClr val="dk1"/>
+            </a:lnRef>
+            <a:fillRef idx="0">
+              <a:schemeClr val="dk1"/>
+            </a:fillRef>
+            <a:effectRef idx="0">
+              <a:schemeClr val="dk1"/>
+            </a:effectRef>
+            <a:fontRef idx="minor">
+              <a:schemeClr val="tx1"/>
+            </a:fontRef>
+          </p:style>
+        </p:cxnSp>
+        <p:cxnSp>
+          <p:nvCxnSpPr>
+            <p:cNvPr id="6" name="Rechte verbindingslijn 5">
+              <a:extLst>
+                <a:ext uri="{FF2B5EF4-FFF2-40B4-BE49-F238E27FC236}">
+                  <a16:creationId xmlns:a16="http://schemas.microsoft.com/office/drawing/2014/main" id="{A12F6BDB-C32F-1148-810D-8724043B4699}"/>
+                </a:ext>
+              </a:extLst>
+            </p:cNvPr>
+            <p:cNvCxnSpPr>
+              <a:cxnSpLocks/>
+            </p:cNvCxnSpPr>
+            <p:nvPr/>
+          </p:nvCxnSpPr>
+          <p:spPr>
+            <a:xfrm>
+              <a:off x="3731889" y="2340234"/>
+              <a:ext cx="581025" cy="228600"/>
+            </a:xfrm>
+            <a:prstGeom prst="line">
+              <a:avLst/>
+            </a:prstGeom>
+          </p:spPr>
+          <p:style>
+            <a:lnRef idx="1">
+              <a:schemeClr val="dk1"/>
+            </a:lnRef>
+            <a:fillRef idx="0">
+              <a:schemeClr val="dk1"/>
+            </a:fillRef>
+            <a:effectRef idx="0">
+              <a:schemeClr val="dk1"/>
+            </a:effectRef>
+            <a:fontRef idx="minor">
+              <a:schemeClr val="tx1"/>
+            </a:fontRef>
+          </p:style>
+        </p:cxnSp>
+        <p:cxnSp>
+          <p:nvCxnSpPr>
+            <p:cNvPr id="9" name="Rechte verbindingslijn 8">
+              <a:extLst>
+                <a:ext uri="{FF2B5EF4-FFF2-40B4-BE49-F238E27FC236}">
+                  <a16:creationId xmlns:a16="http://schemas.microsoft.com/office/drawing/2014/main" id="{8B588FEB-C31A-B24E-9E99-59F3C4246B8B}"/>
+                </a:ext>
+              </a:extLst>
+            </p:cNvPr>
+            <p:cNvCxnSpPr>
+              <a:cxnSpLocks/>
+            </p:cNvCxnSpPr>
+            <p:nvPr/>
+          </p:nvCxnSpPr>
+          <p:spPr>
+            <a:xfrm>
+              <a:off x="3550831" y="4610100"/>
+              <a:ext cx="678269" cy="66620"/>
+            </a:xfrm>
+            <a:prstGeom prst="line">
+              <a:avLst/>
+            </a:prstGeom>
+          </p:spPr>
+          <p:style>
+            <a:lnRef idx="1">
+              <a:schemeClr val="dk1"/>
+            </a:lnRef>
+            <a:fillRef idx="0">
+              <a:schemeClr val="dk1"/>
+            </a:fillRef>
+            <a:effectRef idx="0">
+              <a:schemeClr val="dk1"/>
+            </a:effectRef>
+            <a:fontRef idx="minor">
+              <a:schemeClr val="tx1"/>
+            </a:fontRef>
+          </p:style>
+        </p:cxnSp>
+        <p:cxnSp>
+          <p:nvCxnSpPr>
+            <p:cNvPr id="13" name="Rechte verbindingslijn 12">
+              <a:extLst>
+                <a:ext uri="{FF2B5EF4-FFF2-40B4-BE49-F238E27FC236}">
+                  <a16:creationId xmlns:a16="http://schemas.microsoft.com/office/drawing/2014/main" id="{945A9B28-E4D7-964B-9BAA-FFFE81ADBC04}"/>
+                </a:ext>
+              </a:extLst>
+            </p:cNvPr>
+            <p:cNvCxnSpPr>
+              <a:cxnSpLocks/>
+            </p:cNvCxnSpPr>
+            <p:nvPr/>
+          </p:nvCxnSpPr>
+          <p:spPr>
+            <a:xfrm flipV="1">
+              <a:off x="3505200" y="5639594"/>
+              <a:ext cx="723900" cy="208756"/>
+            </a:xfrm>
+            <a:prstGeom prst="line">
+              <a:avLst/>
+            </a:prstGeom>
+          </p:spPr>
+          <p:style>
+            <a:lnRef idx="1">
+              <a:schemeClr val="dk1"/>
+            </a:lnRef>
+            <a:fillRef idx="0">
+              <a:schemeClr val="dk1"/>
+            </a:fillRef>
+            <a:effectRef idx="0">
+              <a:schemeClr val="dk1"/>
+            </a:effectRef>
+            <a:fontRef idx="minor">
+              <a:schemeClr val="tx1"/>
+            </a:fontRef>
+          </p:style>
+        </p:cxnSp>
+        <p:sp>
+          <p:nvSpPr>
+            <p:cNvPr id="14" name="Tekstvak 13">
+              <a:extLst>
+                <a:ext uri="{FF2B5EF4-FFF2-40B4-BE49-F238E27FC236}">
+                  <a16:creationId xmlns:a16="http://schemas.microsoft.com/office/drawing/2014/main" id="{C2F906C5-CE6F-DD46-B5B3-837D84EE1140}"/>
+                </a:ext>
+              </a:extLst>
+            </p:cNvPr>
+            <p:cNvSpPr txBox="1"/>
+            <p:nvPr/>
+          </p:nvSpPr>
+          <p:spPr>
+            <a:xfrm>
+              <a:off x="4316277" y="556316"/>
+              <a:ext cx="380232" cy="553999"/>
+            </a:xfrm>
+            <a:prstGeom prst="rect">
+              <a:avLst/>
+            </a:prstGeom>
+            <a:noFill/>
+          </p:spPr>
+          <p:txBody>
+            <a:bodyPr wrap="none" rtlCol="0">
+              <a:spAutoFit/>
+            </a:bodyPr>
+            <a:lstStyle/>
+            <a:p>
+              <a:r>
+                <a:rPr lang="nl-NL" sz="3000" dirty="0"/>
+                <a:t>1</a:t>
+              </a:r>
+            </a:p>
+          </p:txBody>
+        </p:sp>
+        <p:sp>
+          <p:nvSpPr>
+            <p:cNvPr id="15" name="Tekstvak 14">
+              <a:extLst>
+                <a:ext uri="{FF2B5EF4-FFF2-40B4-BE49-F238E27FC236}">
+                  <a16:creationId xmlns:a16="http://schemas.microsoft.com/office/drawing/2014/main" id="{69872D71-AA29-3140-A57F-D82813E44068}"/>
+                </a:ext>
+              </a:extLst>
+            </p:cNvPr>
+            <p:cNvSpPr txBox="1"/>
+            <p:nvPr/>
+          </p:nvSpPr>
+          <p:spPr>
+            <a:xfrm>
+              <a:off x="4309677" y="2263050"/>
+              <a:ext cx="380232" cy="553999"/>
+            </a:xfrm>
+            <a:prstGeom prst="rect">
+              <a:avLst/>
+            </a:prstGeom>
+            <a:noFill/>
+          </p:spPr>
+          <p:txBody>
+            <a:bodyPr wrap="none" rtlCol="0">
+              <a:spAutoFit/>
+            </a:bodyPr>
+            <a:lstStyle/>
+            <a:p>
+              <a:r>
+                <a:rPr lang="nl-NL" sz="3000" dirty="0"/>
+                <a:t>2</a:t>
+              </a:r>
+            </a:p>
+          </p:txBody>
+        </p:sp>
+        <p:sp>
+          <p:nvSpPr>
+            <p:cNvPr id="16" name="Tekstvak 15">
+              <a:extLst>
+                <a:ext uri="{FF2B5EF4-FFF2-40B4-BE49-F238E27FC236}">
+                  <a16:creationId xmlns:a16="http://schemas.microsoft.com/office/drawing/2014/main" id="{B0BD0247-F066-A04F-AF45-8B2765623F29}"/>
+                </a:ext>
+              </a:extLst>
+            </p:cNvPr>
+            <p:cNvSpPr txBox="1"/>
+            <p:nvPr/>
+          </p:nvSpPr>
+          <p:spPr>
+            <a:xfrm>
+              <a:off x="4316277" y="4359761"/>
+              <a:ext cx="380232" cy="553999"/>
+            </a:xfrm>
+            <a:prstGeom prst="rect">
+              <a:avLst/>
+            </a:prstGeom>
+            <a:noFill/>
+          </p:spPr>
+          <p:txBody>
+            <a:bodyPr wrap="none" rtlCol="0">
+              <a:spAutoFit/>
+            </a:bodyPr>
+            <a:lstStyle/>
+            <a:p>
+              <a:r>
+                <a:rPr lang="nl-NL" sz="3000" dirty="0"/>
+                <a:t>3</a:t>
+              </a:r>
+            </a:p>
+          </p:txBody>
+        </p:sp>
+        <p:sp>
+          <p:nvSpPr>
+            <p:cNvPr id="17" name="Tekstvak 16">
+              <a:extLst>
+                <a:ext uri="{FF2B5EF4-FFF2-40B4-BE49-F238E27FC236}">
+                  <a16:creationId xmlns:a16="http://schemas.microsoft.com/office/drawing/2014/main" id="{48E55E3E-E0AD-E549-BC97-2EE139DEA40B}"/>
+                </a:ext>
+              </a:extLst>
+            </p:cNvPr>
+            <p:cNvSpPr txBox="1"/>
+            <p:nvPr/>
+          </p:nvSpPr>
+          <p:spPr>
+            <a:xfrm>
+              <a:off x="4316679" y="5294351"/>
+              <a:ext cx="380232" cy="553999"/>
+            </a:xfrm>
+            <a:prstGeom prst="rect">
+              <a:avLst/>
+            </a:prstGeom>
+            <a:noFill/>
+          </p:spPr>
+          <p:txBody>
+            <a:bodyPr wrap="none" rtlCol="0">
+              <a:spAutoFit/>
+            </a:bodyPr>
+            <a:lstStyle/>
+            <a:p>
+              <a:r>
+                <a:rPr lang="nl-NL" sz="3000" dirty="0"/>
+                <a:t>4</a:t>
+              </a:r>
+            </a:p>
+          </p:txBody>
+        </p:sp>
+      </p:grpSp>
+    </p:spTree>
+    <p:extLst>
+      <p:ext uri="{BB962C8B-B14F-4D97-AF65-F5344CB8AC3E}">
+        <p14:creationId xmlns:p14="http://schemas.microsoft.com/office/powerpoint/2010/main" val="3921889931"/>
+      </p:ext>
+    </p:extLst>
+  </p:cSld>
+  <p:clrMapOvr>
+    <a:masterClrMapping/>
+  </p:clrMapOvr>
+</p:sld>
+</file>
+
 <file path=ppt/theme/theme1.xml><?xml version="1.0" encoding="utf-8"?>
 <a:theme xmlns:a="http://schemas.openxmlformats.org/drawingml/2006/main" name="Kantoorthema">
   <a:themeElements>

</xml_diff>

<commit_message>
clean up code, added trainer file for different network training, data file cleanup
</commit_message>
<xml_diff>
--- a/Report/images/ppt_for_editing.pptx
+++ b/Report/images/ppt_for_editing.pptx
@@ -13,6 +13,7 @@
     <p:sldId id="261" r:id="rId7"/>
     <p:sldId id="262" r:id="rId8"/>
     <p:sldId id="263" r:id="rId9"/>
+    <p:sldId id="264" r:id="rId10"/>
   </p:sldIdLst>
   <p:sldSz cx="12192000" cy="6858000"/>
   <p:notesSz cx="6858000" cy="9144000"/>
@@ -266,7 +267,7 @@
           <a:p>
             <a:fld id="{15F5C6DF-5D78-8146-8AF0-DC13752353FA}" type="datetimeFigureOut">
               <a:rPr lang="nl-NL" smtClean="0"/>
-              <a:t>22-03-2022</a:t>
+              <a:t>24-06-2022</a:t>
             </a:fld>
             <a:endParaRPr lang="nl-NL"/>
           </a:p>
@@ -464,7 +465,7 @@
           <a:p>
             <a:fld id="{15F5C6DF-5D78-8146-8AF0-DC13752353FA}" type="datetimeFigureOut">
               <a:rPr lang="nl-NL" smtClean="0"/>
-              <a:t>22-03-2022</a:t>
+              <a:t>24-06-2022</a:t>
             </a:fld>
             <a:endParaRPr lang="nl-NL"/>
           </a:p>
@@ -672,7 +673,7 @@
           <a:p>
             <a:fld id="{15F5C6DF-5D78-8146-8AF0-DC13752353FA}" type="datetimeFigureOut">
               <a:rPr lang="nl-NL" smtClean="0"/>
-              <a:t>22-03-2022</a:t>
+              <a:t>24-06-2022</a:t>
             </a:fld>
             <a:endParaRPr lang="nl-NL"/>
           </a:p>
@@ -870,7 +871,7 @@
           <a:p>
             <a:fld id="{15F5C6DF-5D78-8146-8AF0-DC13752353FA}" type="datetimeFigureOut">
               <a:rPr lang="nl-NL" smtClean="0"/>
-              <a:t>22-03-2022</a:t>
+              <a:t>24-06-2022</a:t>
             </a:fld>
             <a:endParaRPr lang="nl-NL"/>
           </a:p>
@@ -1145,7 +1146,7 @@
           <a:p>
             <a:fld id="{15F5C6DF-5D78-8146-8AF0-DC13752353FA}" type="datetimeFigureOut">
               <a:rPr lang="nl-NL" smtClean="0"/>
-              <a:t>22-03-2022</a:t>
+              <a:t>24-06-2022</a:t>
             </a:fld>
             <a:endParaRPr lang="nl-NL"/>
           </a:p>
@@ -1410,7 +1411,7 @@
           <a:p>
             <a:fld id="{15F5C6DF-5D78-8146-8AF0-DC13752353FA}" type="datetimeFigureOut">
               <a:rPr lang="nl-NL" smtClean="0"/>
-              <a:t>22-03-2022</a:t>
+              <a:t>24-06-2022</a:t>
             </a:fld>
             <a:endParaRPr lang="nl-NL"/>
           </a:p>
@@ -1822,7 +1823,7 @@
           <a:p>
             <a:fld id="{15F5C6DF-5D78-8146-8AF0-DC13752353FA}" type="datetimeFigureOut">
               <a:rPr lang="nl-NL" smtClean="0"/>
-              <a:t>22-03-2022</a:t>
+              <a:t>24-06-2022</a:t>
             </a:fld>
             <a:endParaRPr lang="nl-NL"/>
           </a:p>
@@ -1963,7 +1964,7 @@
           <a:p>
             <a:fld id="{15F5C6DF-5D78-8146-8AF0-DC13752353FA}" type="datetimeFigureOut">
               <a:rPr lang="nl-NL" smtClean="0"/>
-              <a:t>22-03-2022</a:t>
+              <a:t>24-06-2022</a:t>
             </a:fld>
             <a:endParaRPr lang="nl-NL"/>
           </a:p>
@@ -2076,7 +2077,7 @@
           <a:p>
             <a:fld id="{15F5C6DF-5D78-8146-8AF0-DC13752353FA}" type="datetimeFigureOut">
               <a:rPr lang="nl-NL" smtClean="0"/>
-              <a:t>22-03-2022</a:t>
+              <a:t>24-06-2022</a:t>
             </a:fld>
             <a:endParaRPr lang="nl-NL"/>
           </a:p>
@@ -2387,7 +2388,7 @@
           <a:p>
             <a:fld id="{15F5C6DF-5D78-8146-8AF0-DC13752353FA}" type="datetimeFigureOut">
               <a:rPr lang="nl-NL" smtClean="0"/>
-              <a:t>22-03-2022</a:t>
+              <a:t>24-06-2022</a:t>
             </a:fld>
             <a:endParaRPr lang="nl-NL"/>
           </a:p>
@@ -2675,7 +2676,7 @@
           <a:p>
             <a:fld id="{15F5C6DF-5D78-8146-8AF0-DC13752353FA}" type="datetimeFigureOut">
               <a:rPr lang="nl-NL" smtClean="0"/>
-              <a:t>22-03-2022</a:t>
+              <a:t>24-06-2022</a:t>
             </a:fld>
             <a:endParaRPr lang="nl-NL"/>
           </a:p>
@@ -2916,7 +2917,7 @@
           <a:p>
             <a:fld id="{15F5C6DF-5D78-8146-8AF0-DC13752353FA}" type="datetimeFigureOut">
               <a:rPr lang="nl-NL" smtClean="0"/>
-              <a:t>22-03-2022</a:t>
+              <a:t>24-06-2022</a:t>
             </a:fld>
             <a:endParaRPr lang="nl-NL"/>
           </a:p>
@@ -12747,10 +12748,10 @@
         </p:nvGrpSpPr>
         <p:grpSpPr>
           <a:xfrm>
-            <a:off x="696532" y="2822574"/>
-            <a:ext cx="11079577" cy="2556417"/>
-            <a:chOff x="810832" y="2822574"/>
-            <a:chExt cx="11079577" cy="2556417"/>
+            <a:off x="682137" y="2674744"/>
+            <a:ext cx="11065397" cy="2806898"/>
+            <a:chOff x="825012" y="2631882"/>
+            <a:chExt cx="11065397" cy="2806898"/>
           </a:xfrm>
         </p:grpSpPr>
         <p:pic>
@@ -12865,7 +12866,7 @@
           </p:blipFill>
           <p:spPr>
             <a:xfrm>
-              <a:off x="2942601" y="2825767"/>
+              <a:off x="2964417" y="2631882"/>
               <a:ext cx="882500" cy="882500"/>
             </a:xfrm>
             <a:prstGeom prst="rect">
@@ -12970,8 +12971,8 @@
           </p:nvCxnSpPr>
           <p:spPr>
             <a:xfrm flipV="1">
-              <a:off x="2216073" y="3267017"/>
-              <a:ext cx="726528" cy="685029"/>
+              <a:off x="2230253" y="3073132"/>
+              <a:ext cx="734164" cy="810389"/>
             </a:xfrm>
             <a:prstGeom prst="straightConnector1">
               <a:avLst/>
@@ -13010,14 +13011,13 @@
             <p:cNvCxnSpPr>
               <a:cxnSpLocks/>
               <a:stCxn id="70" idx="3"/>
-              <a:endCxn id="58" idx="1"/>
             </p:cNvCxnSpPr>
             <p:nvPr/>
           </p:nvCxnSpPr>
           <p:spPr>
             <a:xfrm>
-              <a:off x="2216073" y="3952046"/>
-              <a:ext cx="645256" cy="555474"/>
+              <a:off x="2230253" y="3883521"/>
+              <a:ext cx="2213160" cy="0"/>
             </a:xfrm>
             <a:prstGeom prst="straightConnector1">
               <a:avLst/>
@@ -13062,8 +13062,8 @@
           </p:nvCxnSpPr>
           <p:spPr>
             <a:xfrm>
-              <a:off x="3825101" y="3267017"/>
-              <a:ext cx="726528" cy="616504"/>
+              <a:off x="3846917" y="3073132"/>
+              <a:ext cx="704712" cy="810389"/>
             </a:xfrm>
             <a:prstGeom prst="straightConnector1">
               <a:avLst/>
@@ -13108,15 +13108,15 @@
           </p:nvCxnSpPr>
           <p:spPr>
             <a:xfrm flipV="1">
-              <a:off x="3976991" y="3883521"/>
-              <a:ext cx="574638" cy="623999"/>
+              <a:off x="3963498" y="3883521"/>
+              <a:ext cx="588131" cy="739864"/>
             </a:xfrm>
             <a:prstGeom prst="straightConnector1">
               <a:avLst/>
             </a:prstGeom>
             <a:ln w="38100">
               <a:solidFill>
-                <a:srgbClr val="92D050"/>
+                <a:srgbClr val="A3CEED"/>
               </a:solidFill>
               <a:tailEnd type="triangle"/>
             </a:ln>
@@ -13342,7 +13342,7 @@
           </p:blipFill>
           <p:spPr>
             <a:xfrm>
-              <a:off x="2861329" y="3949689"/>
+              <a:off x="2847836" y="4065554"/>
               <a:ext cx="1115662" cy="1115662"/>
             </a:xfrm>
             <a:prstGeom prst="rect">
@@ -13364,10 +13364,10 @@
           </p:nvGrpSpPr>
           <p:grpSpPr>
             <a:xfrm>
-              <a:off x="810832" y="2822574"/>
-              <a:ext cx="1405241" cy="2121894"/>
-              <a:chOff x="2571750" y="161026"/>
-              <a:chExt cx="1405241" cy="2121894"/>
+              <a:off x="825012" y="2822574"/>
+              <a:ext cx="1405241" cy="2053369"/>
+              <a:chOff x="2585930" y="161026"/>
+              <a:chExt cx="1405241" cy="2053369"/>
             </a:xfrm>
           </p:grpSpPr>
           <p:pic>
@@ -13392,7 +13392,7 @@
             </p:blipFill>
             <p:spPr>
               <a:xfrm>
-                <a:off x="2822614" y="1276688"/>
+                <a:off x="2825622" y="1191225"/>
                 <a:ext cx="1002487" cy="1002487"/>
               </a:xfrm>
               <a:prstGeom prst="rect">
@@ -13444,7 +13444,7 @@
             </p:nvSpPr>
             <p:spPr>
               <a:xfrm>
-                <a:off x="2571750" y="298076"/>
+                <a:off x="2585930" y="229551"/>
                 <a:ext cx="1405241" cy="1984844"/>
               </a:xfrm>
               <a:prstGeom prst="rect">
@@ -13527,7 +13527,7 @@
           </p:nvSpPr>
           <p:spPr>
             <a:xfrm>
-              <a:off x="2729154" y="3690479"/>
+              <a:off x="2730929" y="3575774"/>
               <a:ext cx="1299202" cy="276999"/>
             </a:xfrm>
             <a:prstGeom prst="rect">
@@ -13567,7 +13567,7 @@
           </p:nvSpPr>
           <p:spPr>
             <a:xfrm>
-              <a:off x="2579337" y="5065351"/>
+              <a:off x="2554618" y="5161781"/>
               <a:ext cx="1786066" cy="276999"/>
             </a:xfrm>
             <a:prstGeom prst="rect">
@@ -13689,8 +13689,8 @@
           </p:nvSpPr>
           <p:spPr>
             <a:xfrm>
-              <a:off x="7869085" y="4507520"/>
-              <a:ext cx="774571" cy="276999"/>
+              <a:off x="7730425" y="4507520"/>
+              <a:ext cx="1051891" cy="276999"/>
             </a:xfrm>
             <a:prstGeom prst="rect">
               <a:avLst/>
@@ -13707,7 +13707,7 @@
                 <a:rPr lang="nl-NL" sz="1200" dirty="0" err="1">
                   <a:latin typeface="Avenir Book" panose="02000503020000020003" pitchFamily="2" charset="0"/>
                 </a:rPr>
-                <a:t>icoFoam</a:t>
+                <a:t>pimpleFoam</a:t>
               </a:r>
               <a:endParaRPr lang="nl-NL" sz="1200" dirty="0">
                 <a:latin typeface="Avenir Book" panose="02000503020000020003" pitchFamily="2" charset="0"/>
@@ -14197,6 +14197,94 @@
 </p:sld>
 </file>
 
+<file path=ppt/slides/slide9.xml><?xml version="1.0" encoding="utf-8"?>
+<p:sld xmlns:a="http://schemas.openxmlformats.org/drawingml/2006/main" xmlns:r="http://schemas.openxmlformats.org/officeDocument/2006/relationships" xmlns:p="http://schemas.openxmlformats.org/presentationml/2006/main">
+  <p:cSld>
+    <p:spTree>
+      <p:nvGrpSpPr>
+        <p:cNvPr id="1" name=""/>
+        <p:cNvGrpSpPr/>
+        <p:nvPr/>
+      </p:nvGrpSpPr>
+      <p:grpSpPr>
+        <a:xfrm>
+          <a:off x="0" y="0"/>
+          <a:ext cx="0" cy="0"/>
+          <a:chOff x="0" y="0"/>
+          <a:chExt cx="0" cy="0"/>
+        </a:xfrm>
+      </p:grpSpPr>
+      <p:pic>
+        <p:nvPicPr>
+          <p:cNvPr id="5" name="Afbeelding 4">
+            <a:extLst>
+              <a:ext uri="{FF2B5EF4-FFF2-40B4-BE49-F238E27FC236}">
+                <a16:creationId xmlns:a16="http://schemas.microsoft.com/office/drawing/2014/main" id="{D1F089B0-734A-3D48-BEEC-F37F07280A49}"/>
+              </a:ext>
+            </a:extLst>
+          </p:cNvPr>
+          <p:cNvPicPr>
+            <a:picLocks noChangeAspect="1"/>
+          </p:cNvPicPr>
+          <p:nvPr/>
+        </p:nvPicPr>
+        <p:blipFill rotWithShape="1">
+          <a:blip r:embed="rId2"/>
+          <a:srcRect l="41660" r="39708"/>
+          <a:stretch/>
+        </p:blipFill>
+        <p:spPr>
+          <a:xfrm>
+            <a:off x="3557587" y="1123950"/>
+            <a:ext cx="2271712" cy="2438400"/>
+          </a:xfrm>
+          <a:prstGeom prst="rect">
+            <a:avLst/>
+          </a:prstGeom>
+        </p:spPr>
+      </p:pic>
+      <p:pic>
+        <p:nvPicPr>
+          <p:cNvPr id="7" name="Afbeelding 6">
+            <a:extLst>
+              <a:ext uri="{FF2B5EF4-FFF2-40B4-BE49-F238E27FC236}">
+                <a16:creationId xmlns:a16="http://schemas.microsoft.com/office/drawing/2014/main" id="{72DCD55F-2382-B94B-B2EE-764749865CD4}"/>
+              </a:ext>
+            </a:extLst>
+          </p:cNvPr>
+          <p:cNvPicPr>
+            <a:picLocks noChangeAspect="1"/>
+          </p:cNvPicPr>
+          <p:nvPr/>
+        </p:nvPicPr>
+        <p:blipFill rotWithShape="1">
+          <a:blip r:embed="rId3"/>
+          <a:srcRect l="41367" r="40000"/>
+          <a:stretch/>
+        </p:blipFill>
+        <p:spPr>
+          <a:xfrm>
+            <a:off x="1285875" y="1123950"/>
+            <a:ext cx="2271712" cy="2438400"/>
+          </a:xfrm>
+          <a:prstGeom prst="rect">
+            <a:avLst/>
+          </a:prstGeom>
+        </p:spPr>
+      </p:pic>
+    </p:spTree>
+    <p:extLst>
+      <p:ext uri="{BB962C8B-B14F-4D97-AF65-F5344CB8AC3E}">
+        <p14:creationId xmlns:p14="http://schemas.microsoft.com/office/powerpoint/2010/main" val="395623387"/>
+      </p:ext>
+    </p:extLst>
+  </p:cSld>
+  <p:clrMapOvr>
+    <a:masterClrMapping/>
+  </p:clrMapOvr>
+</p:sld>
+</file>
+
 <file path=ppt/theme/theme1.xml><?xml version="1.0" encoding="utf-8"?>
 <a:theme xmlns:a="http://schemas.openxmlformats.org/drawingml/2006/main" name="Kantoorthema">
   <a:themeElements>

</xml_diff>